<commit_message>
Updated PPT Changed port for Social from 1337 to 1234
</commit_message>
<xml_diff>
--- a/slides/AspNetWebSecurity.pptx
+++ b/slides/AspNetWebSecurity.pptx
@@ -6,33 +6,34 @@
     <p:sldMasterId id="2147483656" r:id="rId2"/>
   </p:sldMasterIdLst>
   <p:notesMasterIdLst>
-    <p:notesMasterId r:id="rId19"/>
+    <p:notesMasterId r:id="rId20"/>
   </p:notesMasterIdLst>
   <p:handoutMasterIdLst>
-    <p:handoutMasterId r:id="rId20"/>
+    <p:handoutMasterId r:id="rId21"/>
   </p:handoutMasterIdLst>
   <p:sldIdLst>
     <p:sldId id="676" r:id="rId3"/>
     <p:sldId id="700" r:id="rId4"/>
-    <p:sldId id="677" r:id="rId5"/>
-    <p:sldId id="701" r:id="rId6"/>
-    <p:sldId id="705" r:id="rId7"/>
-    <p:sldId id="708" r:id="rId8"/>
-    <p:sldId id="709" r:id="rId9"/>
-    <p:sldId id="713" r:id="rId10"/>
-    <p:sldId id="714" r:id="rId11"/>
-    <p:sldId id="710" r:id="rId12"/>
-    <p:sldId id="711" r:id="rId13"/>
-    <p:sldId id="706" r:id="rId14"/>
-    <p:sldId id="712" r:id="rId15"/>
-    <p:sldId id="707" r:id="rId16"/>
-    <p:sldId id="702" r:id="rId17"/>
-    <p:sldId id="696" r:id="rId18"/>
+    <p:sldId id="715" r:id="rId5"/>
+    <p:sldId id="677" r:id="rId6"/>
+    <p:sldId id="701" r:id="rId7"/>
+    <p:sldId id="705" r:id="rId8"/>
+    <p:sldId id="708" r:id="rId9"/>
+    <p:sldId id="709" r:id="rId10"/>
+    <p:sldId id="713" r:id="rId11"/>
+    <p:sldId id="714" r:id="rId12"/>
+    <p:sldId id="710" r:id="rId13"/>
+    <p:sldId id="711" r:id="rId14"/>
+    <p:sldId id="706" r:id="rId15"/>
+    <p:sldId id="712" r:id="rId16"/>
+    <p:sldId id="707" r:id="rId17"/>
+    <p:sldId id="702" r:id="rId18"/>
+    <p:sldId id="696" r:id="rId19"/>
   </p:sldIdLst>
   <p:sldSz cx="9144000" cy="5143500" type="screen16x9"/>
   <p:notesSz cx="9601200" cy="7315200"/>
   <p:custDataLst>
-    <p:tags r:id="rId21"/>
+    <p:tags r:id="rId22"/>
   </p:custDataLst>
   <p:defaultTextStyle>
     <a:defPPr>
@@ -287,7 +288,7 @@
               <a:pPr>
                 <a:defRPr/>
               </a:pPr>
-              <a:t>3/15/2016 10:32 PM</a:t>
+              <a:t>3/17/2016 9:20 AM</a:t>
             </a:fld>
             <a:endParaRPr lang="en-US"/>
           </a:p>
@@ -502,7 +503,7 @@
               <a:pPr>
                 <a:defRPr/>
               </a:pPr>
-              <a:t>3/15/2016 10:32 PM</a:t>
+              <a:t>3/17/2016 9:20 AM</a:t>
             </a:fld>
             <a:endParaRPr lang="en-US"/>
           </a:p>
@@ -907,7 +908,7 @@
             <a:fld id="{645EDAD1-88E4-4536-AD95-0BFD82EC77E6}" type="datetime8">
               <a:rPr lang="en-US" smtClean="0"/>
               <a:pPr/>
-              <a:t>3/15/2016 10:32 PM</a:t>
+              <a:t>3/17/2016 9:20 AM</a:t>
             </a:fld>
             <a:endParaRPr lang="en-US" smtClean="0"/>
           </a:p>
@@ -6832,7 +6833,7 @@
           <a:p>
             <a:r>
               <a:rPr lang="en-US" b="1" dirty="0" smtClean="0"/>
-              <a:t>OAuth 2 Flow</a:t>
+              <a:t>Authentication Flow</a:t>
             </a:r>
             <a:endParaRPr lang="en-US" b="1" dirty="0"/>
           </a:p>
@@ -6851,7 +6852,7 @@
         <p:spPr>
           <a:xfrm>
             <a:off x="381003" y="1063228"/>
-            <a:ext cx="8410575" cy="3046988"/>
+            <a:ext cx="8410575" cy="2160591"/>
           </a:xfrm>
         </p:spPr>
         <p:txBody>
@@ -6859,62 +6860,35 @@
           <a:lstStyle/>
           <a:p>
             <a:r>
-              <a:rPr lang="en-US" b="1" dirty="0" smtClean="0"/>
-              <a:t>Application</a:t>
-            </a:r>
+              <a:rPr lang="en-US" dirty="0">
+                <a:effectLst/>
+              </a:rPr>
+              <a:t> </a:t>
+            </a:r>
+            <a:r>
+              <a:rPr lang="en-US" dirty="0"/>
+              <a:t>OpenID Connect</a:t>
+            </a:r>
+          </a:p>
+          <a:p>
+            <a:pPr lvl="1"/>
             <a:r>
               <a:rPr lang="en-US" dirty="0" smtClean="0"/>
-              <a:t> redirects </a:t>
-            </a:r>
-            <a:r>
-              <a:rPr lang="en-US" b="1" dirty="0" smtClean="0"/>
-              <a:t>User</a:t>
-            </a:r>
+              <a:t>Uses OAuth 2 flow</a:t>
+            </a:r>
+          </a:p>
+          <a:p>
+            <a:pPr lvl="1"/>
             <a:r>
               <a:rPr lang="en-US" dirty="0" smtClean="0"/>
-              <a:t> to </a:t>
-            </a:r>
-            <a:r>
-              <a:rPr lang="en-US" b="1" dirty="0" smtClean="0"/>
-              <a:t>Service</a:t>
-            </a:r>
-            <a:r>
-              <a:rPr lang="en-US" dirty="0" smtClean="0"/>
-              <a:t> for </a:t>
-            </a:r>
-            <a:r>
-              <a:rPr lang="en-US" i="1" dirty="0" smtClean="0"/>
-              <a:t>authorization</a:t>
-            </a:r>
-            <a:endParaRPr lang="en-US" b="1" dirty="0" smtClean="0"/>
-          </a:p>
-          <a:p>
-            <a:r>
-              <a:rPr lang="en-US" dirty="0" smtClean="0"/>
-              <a:t>User </a:t>
-            </a:r>
-            <a:r>
-              <a:rPr lang="en-US" i="1" dirty="0" smtClean="0"/>
-              <a:t>authenticates</a:t>
-            </a:r>
-            <a:r>
-              <a:rPr lang="en-US" dirty="0" smtClean="0"/>
-              <a:t> into Service and grants Application access to </a:t>
-            </a:r>
-            <a:r>
-              <a:rPr lang="en-US" b="1" dirty="0" smtClean="0"/>
-              <a:t>Resources</a:t>
-            </a:r>
-          </a:p>
-          <a:p>
-            <a:r>
-              <a:rPr lang="en-US" dirty="0" smtClean="0"/>
-              <a:t>Service redirects User back to Application (via Redirect URL) with a special </a:t>
-            </a:r>
-            <a:r>
-              <a:rPr lang="en-US" b="1" dirty="0" smtClean="0"/>
-              <a:t>Code</a:t>
-            </a:r>
+              <a:t>Adds </a:t>
+            </a:r>
+            <a:r>
+              <a:rPr lang="en-US" dirty="0"/>
+              <a:t>User Information exchange via claims</a:t>
+            </a:r>
+          </a:p>
+          <a:p>
             <a:endParaRPr lang="en-US" dirty="0"/>
           </a:p>
         </p:txBody>
@@ -6922,7 +6896,7 @@
     </p:spTree>
     <p:extLst>
       <p:ext uri="{BB962C8B-B14F-4D97-AF65-F5344CB8AC3E}">
-        <p14:creationId xmlns:p14="http://schemas.microsoft.com/office/powerpoint/2010/main" val="759927181"/>
+        <p14:creationId xmlns:p14="http://schemas.microsoft.com/office/powerpoint/2010/main" val="34081150"/>
       </p:ext>
     </p:extLst>
   </p:cSld>
@@ -7003,6 +6977,150 @@
           <a:lstStyle/>
           <a:p>
             <a:r>
+              <a:rPr lang="en-US" b="1" dirty="0" smtClean="0"/>
+              <a:t>Application</a:t>
+            </a:r>
+            <a:r>
+              <a:rPr lang="en-US" dirty="0" smtClean="0"/>
+              <a:t> redirects </a:t>
+            </a:r>
+            <a:r>
+              <a:rPr lang="en-US" b="1" dirty="0" smtClean="0"/>
+              <a:t>User</a:t>
+            </a:r>
+            <a:r>
+              <a:rPr lang="en-US" dirty="0" smtClean="0"/>
+              <a:t> to </a:t>
+            </a:r>
+            <a:r>
+              <a:rPr lang="en-US" b="1" dirty="0" smtClean="0"/>
+              <a:t>Service</a:t>
+            </a:r>
+            <a:r>
+              <a:rPr lang="en-US" dirty="0" smtClean="0"/>
+              <a:t> for </a:t>
+            </a:r>
+            <a:r>
+              <a:rPr lang="en-US" i="1" dirty="0" smtClean="0"/>
+              <a:t>authorization</a:t>
+            </a:r>
+            <a:endParaRPr lang="en-US" b="1" dirty="0" smtClean="0"/>
+          </a:p>
+          <a:p>
+            <a:r>
+              <a:rPr lang="en-US" dirty="0" smtClean="0"/>
+              <a:t>User </a:t>
+            </a:r>
+            <a:r>
+              <a:rPr lang="en-US" i="1" dirty="0" smtClean="0"/>
+              <a:t>authenticates</a:t>
+            </a:r>
+            <a:r>
+              <a:rPr lang="en-US" dirty="0" smtClean="0"/>
+              <a:t> into Service and grants Application access to </a:t>
+            </a:r>
+            <a:r>
+              <a:rPr lang="en-US" b="1" dirty="0" smtClean="0"/>
+              <a:t>Resources</a:t>
+            </a:r>
+          </a:p>
+          <a:p>
+            <a:r>
+              <a:rPr lang="en-US" dirty="0" smtClean="0"/>
+              <a:t>Service redirects User back to Application (via Redirect URL) with a special </a:t>
+            </a:r>
+            <a:r>
+              <a:rPr lang="en-US" b="1" dirty="0" smtClean="0"/>
+              <a:t>Code</a:t>
+            </a:r>
+            <a:endParaRPr lang="en-US" dirty="0"/>
+          </a:p>
+        </p:txBody>
+      </p:sp>
+    </p:spTree>
+    <p:extLst>
+      <p:ext uri="{BB962C8B-B14F-4D97-AF65-F5344CB8AC3E}">
+        <p14:creationId xmlns:p14="http://schemas.microsoft.com/office/powerpoint/2010/main" val="759927181"/>
+      </p:ext>
+    </p:extLst>
+  </p:cSld>
+  <p:clrMapOvr>
+    <a:masterClrMapping/>
+  </p:clrMapOvr>
+  <p:transition>
+    <p:fade/>
+  </p:transition>
+  <p:timing>
+    <p:tnLst>
+      <p:par>
+        <p:cTn id="1" dur="indefinite" restart="never" nodeType="tmRoot"/>
+      </p:par>
+    </p:tnLst>
+  </p:timing>
+</p:sld>
+</file>
+
+<file path=ppt/slides/slide12.xml><?xml version="1.0" encoding="utf-8"?>
+<p:sld xmlns:a="http://schemas.openxmlformats.org/drawingml/2006/main" xmlns:r="http://schemas.openxmlformats.org/officeDocument/2006/relationships" xmlns:p="http://schemas.openxmlformats.org/presentationml/2006/main">
+  <p:cSld>
+    <p:spTree>
+      <p:nvGrpSpPr>
+        <p:cNvPr id="1" name=""/>
+        <p:cNvGrpSpPr/>
+        <p:nvPr/>
+      </p:nvGrpSpPr>
+      <p:grpSpPr>
+        <a:xfrm>
+          <a:off x="0" y="0"/>
+          <a:ext cx="0" cy="0"/>
+          <a:chOff x="0" y="0"/>
+          <a:chExt cx="0" cy="0"/>
+        </a:xfrm>
+      </p:grpSpPr>
+      <p:sp>
+        <p:nvSpPr>
+          <p:cNvPr id="2" name="Title 1"/>
+          <p:cNvSpPr>
+            <a:spLocks noGrp="1"/>
+          </p:cNvSpPr>
+          <p:nvPr>
+            <p:ph type="title"/>
+          </p:nvPr>
+        </p:nvSpPr>
+        <p:spPr/>
+        <p:txBody>
+          <a:bodyPr/>
+          <a:lstStyle/>
+          <a:p>
+            <a:r>
+              <a:rPr lang="en-US" b="1" dirty="0" smtClean="0"/>
+              <a:t>OAuth 2 Flow</a:t>
+            </a:r>
+            <a:endParaRPr lang="en-US" b="1" dirty="0"/>
+          </a:p>
+        </p:txBody>
+      </p:sp>
+      <p:sp>
+        <p:nvSpPr>
+          <p:cNvPr id="3" name="Content Placeholder 2"/>
+          <p:cNvSpPr>
+            <a:spLocks noGrp="1"/>
+          </p:cNvSpPr>
+          <p:nvPr>
+            <p:ph idx="1"/>
+          </p:nvPr>
+        </p:nvSpPr>
+        <p:spPr>
+          <a:xfrm>
+            <a:off x="381003" y="1063228"/>
+            <a:ext cx="8410575" cy="3046988"/>
+          </a:xfrm>
+        </p:spPr>
+        <p:txBody>
+          <a:bodyPr/>
+          <a:lstStyle/>
+          <a:p>
+            <a:r>
               <a:rPr lang="en-US" dirty="0" smtClean="0"/>
               <a:t>Application uses Code to get an </a:t>
             </a:r>
@@ -7050,7 +7168,7 @@
 </p:sld>
 </file>
 
-<file path=ppt/slides/slide12.xml><?xml version="1.0" encoding="utf-8"?>
+<file path=ppt/slides/slide13.xml><?xml version="1.0" encoding="utf-8"?>
 <p:sld xmlns:a="http://schemas.openxmlformats.org/drawingml/2006/main" xmlns:r="http://schemas.openxmlformats.org/officeDocument/2006/relationships" xmlns:p="http://schemas.openxmlformats.org/presentationml/2006/main">
   <p:cSld>
     <p:spTree>
@@ -7582,196 +7700,6 @@
 </p:sld>
 </file>
 
-<file path=ppt/slides/slide13.xml><?xml version="1.0" encoding="utf-8"?>
-<p:sld xmlns:a="http://schemas.openxmlformats.org/drawingml/2006/main" xmlns:r="http://schemas.openxmlformats.org/officeDocument/2006/relationships" xmlns:p="http://schemas.openxmlformats.org/presentationml/2006/main">
-  <p:cSld>
-    <p:spTree>
-      <p:nvGrpSpPr>
-        <p:cNvPr id="1" name=""/>
-        <p:cNvGrpSpPr/>
-        <p:nvPr/>
-      </p:nvGrpSpPr>
-      <p:grpSpPr>
-        <a:xfrm>
-          <a:off x="0" y="0"/>
-          <a:ext cx="0" cy="0"/>
-          <a:chOff x="0" y="0"/>
-          <a:chExt cx="0" cy="0"/>
-        </a:xfrm>
-      </p:grpSpPr>
-      <p:sp>
-        <p:nvSpPr>
-          <p:cNvPr id="2" name="Title 1"/>
-          <p:cNvSpPr>
-            <a:spLocks noGrp="1"/>
-          </p:cNvSpPr>
-          <p:nvPr>
-            <p:ph type="title"/>
-          </p:nvPr>
-        </p:nvSpPr>
-        <p:spPr/>
-        <p:txBody>
-          <a:bodyPr/>
-          <a:lstStyle/>
-          <a:p>
-            <a:r>
-              <a:rPr lang="en-US" b="1" dirty="0" smtClean="0"/>
-              <a:t>OpenID Connect Flow</a:t>
-            </a:r>
-            <a:endParaRPr lang="en-US" b="1" dirty="0"/>
-          </a:p>
-        </p:txBody>
-      </p:sp>
-      <p:sp>
-        <p:nvSpPr>
-          <p:cNvPr id="3" name="Content Placeholder 2"/>
-          <p:cNvSpPr>
-            <a:spLocks noGrp="1"/>
-          </p:cNvSpPr>
-          <p:nvPr>
-            <p:ph idx="1"/>
-          </p:nvPr>
-        </p:nvSpPr>
-        <p:spPr>
-          <a:xfrm>
-            <a:off x="381003" y="1063228"/>
-            <a:ext cx="8410575" cy="2012859"/>
-          </a:xfrm>
-        </p:spPr>
-        <p:txBody>
-          <a:bodyPr/>
-          <a:lstStyle/>
-          <a:p>
-            <a:r>
-              <a:rPr lang="en-US" dirty="0">
-                <a:effectLst/>
-              </a:rPr>
-              <a:t>R</a:t>
-            </a:r>
-            <a:r>
-              <a:rPr lang="en-US" dirty="0" smtClean="0">
-                <a:effectLst/>
-              </a:rPr>
-              <a:t>elying </a:t>
-            </a:r>
-            <a:r>
-              <a:rPr lang="en-US" dirty="0">
-                <a:effectLst/>
-              </a:rPr>
-              <a:t>P</a:t>
-            </a:r>
-            <a:r>
-              <a:rPr lang="en-US" dirty="0" smtClean="0">
-                <a:effectLst/>
-              </a:rPr>
-              <a:t>arty </a:t>
-            </a:r>
-            <a:r>
-              <a:rPr lang="en-US" dirty="0">
-                <a:effectLst/>
-              </a:rPr>
-              <a:t>sends a request to the </a:t>
-            </a:r>
-            <a:r>
-              <a:rPr lang="en-US" b="1" dirty="0" smtClean="0">
-                <a:effectLst/>
-              </a:rPr>
-              <a:t>User </a:t>
-            </a:r>
-            <a:r>
-              <a:rPr lang="en-US" b="1" dirty="0">
-                <a:effectLst/>
-              </a:rPr>
-              <a:t>I</a:t>
-            </a:r>
-            <a:r>
-              <a:rPr lang="en-US" b="1" dirty="0" smtClean="0">
-                <a:effectLst/>
-              </a:rPr>
-              <a:t>nfo</a:t>
-            </a:r>
-            <a:r>
-              <a:rPr lang="en-US" dirty="0" smtClean="0">
-                <a:effectLst/>
-              </a:rPr>
-              <a:t> </a:t>
-            </a:r>
-            <a:r>
-              <a:rPr lang="en-US" dirty="0">
-                <a:effectLst/>
-              </a:rPr>
-              <a:t>endpoint with the access </a:t>
-            </a:r>
-            <a:r>
-              <a:rPr lang="en-US" dirty="0" smtClean="0">
-                <a:effectLst/>
-              </a:rPr>
-              <a:t>token.</a:t>
-            </a:r>
-            <a:endParaRPr lang="en-US" dirty="0">
-              <a:effectLst/>
-            </a:endParaRPr>
-          </a:p>
-          <a:p>
-            <a:r>
-              <a:rPr lang="en-US" dirty="0" smtClean="0">
-                <a:effectLst/>
-              </a:rPr>
-              <a:t>User Info </a:t>
-            </a:r>
-            <a:r>
-              <a:rPr lang="en-US" dirty="0">
-                <a:effectLst/>
-              </a:rPr>
-              <a:t>endpoint returns the </a:t>
-            </a:r>
-            <a:r>
-              <a:rPr lang="en-US" b="1" dirty="0" smtClean="0">
-                <a:effectLst/>
-              </a:rPr>
-              <a:t>Claims</a:t>
-            </a:r>
-            <a:r>
-              <a:rPr lang="en-US" dirty="0">
-                <a:effectLst/>
-              </a:rPr>
-              <a:t> </a:t>
-            </a:r>
-            <a:r>
-              <a:rPr lang="en-US" dirty="0" smtClean="0">
-                <a:effectLst/>
-              </a:rPr>
-              <a:t>for the User.</a:t>
-            </a:r>
-            <a:endParaRPr lang="en-US" dirty="0">
-              <a:effectLst/>
-            </a:endParaRPr>
-          </a:p>
-        </p:txBody>
-      </p:sp>
-    </p:spTree>
-    <p:extLst>
-      <p:ext uri="{BB962C8B-B14F-4D97-AF65-F5344CB8AC3E}">
-        <p14:creationId xmlns:p14="http://schemas.microsoft.com/office/powerpoint/2010/main" val="1344483241"/>
-      </p:ext>
-    </p:extLst>
-  </p:cSld>
-  <p:clrMapOvr>
-    <a:masterClrMapping/>
-  </p:clrMapOvr>
-  <p:transition>
-    <p:fade/>
-  </p:transition>
-  <p:timing>
-    <p:tnLst>
-      <p:par>
-        <p:cTn id="1" dur="indefinite" restart="never" nodeType="tmRoot"/>
-      </p:par>
-    </p:tnLst>
-  </p:timing>
-</p:sld>
-</file>
-
 <file path=ppt/slides/slide14.xml><?xml version="1.0" encoding="utf-8"?>
 <p:sld xmlns:a="http://schemas.openxmlformats.org/drawingml/2006/main" xmlns:r="http://schemas.openxmlformats.org/officeDocument/2006/relationships" xmlns:p="http://schemas.openxmlformats.org/presentationml/2006/main">
   <p:cSld>
@@ -7799,10 +7727,33 @@
             <p:ph type="title"/>
           </p:nvPr>
         </p:nvSpPr>
+        <p:spPr/>
+        <p:txBody>
+          <a:bodyPr/>
+          <a:lstStyle/>
+          <a:p>
+            <a:r>
+              <a:rPr lang="en-US" b="1" dirty="0" smtClean="0"/>
+              <a:t>OpenID Connect Flow</a:t>
+            </a:r>
+            <a:endParaRPr lang="en-US" b="1" dirty="0"/>
+          </a:p>
+        </p:txBody>
+      </p:sp>
+      <p:sp>
+        <p:nvSpPr>
+          <p:cNvPr id="3" name="Content Placeholder 2"/>
+          <p:cNvSpPr>
+            <a:spLocks noGrp="1"/>
+          </p:cNvSpPr>
+          <p:nvPr>
+            <p:ph idx="1"/>
+          </p:nvPr>
+        </p:nvSpPr>
         <p:spPr>
           <a:xfrm>
-            <a:off x="381000" y="171450"/>
-            <a:ext cx="8382000" cy="769441"/>
+            <a:off x="381003" y="1063228"/>
+            <a:ext cx="8410575" cy="2012859"/>
           </a:xfrm>
         </p:spPr>
         <p:txBody>
@@ -7810,48 +7761,116 @@
           <a:lstStyle/>
           <a:p>
             <a:r>
-              <a:rPr lang="en-US" b="1" dirty="0" smtClean="0"/>
-              <a:t>Huh?</a:t>
-            </a:r>
-            <a:endParaRPr lang="en-US" b="1" dirty="0"/>
-          </a:p>
-        </p:txBody>
-      </p:sp>
-      <p:sp>
-        <p:nvSpPr>
-          <p:cNvPr id="3" name="Content Placeholder 2"/>
-          <p:cNvSpPr>
-            <a:spLocks noGrp="1"/>
-          </p:cNvSpPr>
-          <p:nvPr>
-            <p:ph idx="1"/>
-          </p:nvPr>
-        </p:nvSpPr>
-        <p:spPr>
-          <a:xfrm>
-            <a:off x="366714" y="2283210"/>
-            <a:ext cx="8410575" cy="769441"/>
-          </a:xfrm>
-        </p:spPr>
-        <p:txBody>
-          <a:bodyPr/>
-          <a:lstStyle/>
-          <a:p>
-            <a:pPr algn="ctr">
-              <a:buNone/>
-            </a:pPr>
-            <a:r>
-              <a:rPr lang="en-US" sz="4800" b="1" dirty="0" smtClean="0"/>
-              <a:t>Huh?</a:t>
-            </a:r>
-            <a:endParaRPr lang="en-US" sz="2800" b="1" dirty="0" smtClean="0"/>
+              <a:rPr lang="en-US" dirty="0">
+                <a:effectLst/>
+              </a:rPr>
+              <a:t>R</a:t>
+            </a:r>
+            <a:r>
+              <a:rPr lang="en-US" dirty="0" smtClean="0">
+                <a:effectLst/>
+              </a:rPr>
+              <a:t>elying </a:t>
+            </a:r>
+            <a:r>
+              <a:rPr lang="en-US" dirty="0">
+                <a:effectLst/>
+              </a:rPr>
+              <a:t>P</a:t>
+            </a:r>
+            <a:r>
+              <a:rPr lang="en-US" dirty="0" smtClean="0">
+                <a:effectLst/>
+              </a:rPr>
+              <a:t>arty </a:t>
+            </a:r>
+            <a:r>
+              <a:rPr lang="en-US" dirty="0">
+                <a:effectLst/>
+              </a:rPr>
+              <a:t>sends a request to the </a:t>
+            </a:r>
+            <a:r>
+              <a:rPr lang="en-US" b="1" dirty="0" smtClean="0">
+                <a:effectLst/>
+              </a:rPr>
+              <a:t>User </a:t>
+            </a:r>
+            <a:r>
+              <a:rPr lang="en-US" b="1" dirty="0">
+                <a:effectLst/>
+              </a:rPr>
+              <a:t>I</a:t>
+            </a:r>
+            <a:r>
+              <a:rPr lang="en-US" b="1" dirty="0" smtClean="0">
+                <a:effectLst/>
+              </a:rPr>
+              <a:t>nfo</a:t>
+            </a:r>
+            <a:r>
+              <a:rPr lang="en-US" dirty="0" smtClean="0">
+                <a:effectLst/>
+              </a:rPr>
+              <a:t> </a:t>
+            </a:r>
+            <a:r>
+              <a:rPr lang="en-US" dirty="0">
+                <a:effectLst/>
+              </a:rPr>
+              <a:t>endpoint with the access </a:t>
+            </a:r>
+            <a:r>
+              <a:rPr lang="en-US" dirty="0" smtClean="0">
+                <a:effectLst/>
+              </a:rPr>
+              <a:t>token.</a:t>
+            </a:r>
+            <a:endParaRPr lang="en-US" dirty="0">
+              <a:effectLst/>
+            </a:endParaRPr>
+          </a:p>
+          <a:p>
+            <a:r>
+              <a:rPr lang="en-US" dirty="0" smtClean="0">
+                <a:effectLst/>
+              </a:rPr>
+              <a:t>User Info </a:t>
+            </a:r>
+            <a:r>
+              <a:rPr lang="en-US" dirty="0">
+                <a:effectLst/>
+              </a:rPr>
+              <a:t>endpoint returns the </a:t>
+            </a:r>
+            <a:r>
+              <a:rPr lang="en-US" b="1" dirty="0" smtClean="0">
+                <a:effectLst/>
+              </a:rPr>
+              <a:t>Claims</a:t>
+            </a:r>
+            <a:r>
+              <a:rPr lang="en-US" dirty="0">
+                <a:effectLst/>
+              </a:rPr>
+              <a:t> </a:t>
+            </a:r>
+            <a:r>
+              <a:rPr lang="en-US" dirty="0" smtClean="0">
+                <a:effectLst/>
+              </a:rPr>
+              <a:t>for the User.</a:t>
+            </a:r>
+            <a:endParaRPr lang="en-US" dirty="0">
+              <a:effectLst/>
+            </a:endParaRPr>
           </a:p>
         </p:txBody>
       </p:sp>
     </p:spTree>
     <p:extLst>
       <p:ext uri="{BB962C8B-B14F-4D97-AF65-F5344CB8AC3E}">
-        <p14:creationId xmlns:p14="http://schemas.microsoft.com/office/powerpoint/2010/main" val="955297497"/>
+        <p14:creationId xmlns:p14="http://schemas.microsoft.com/office/powerpoint/2010/main" val="1344483241"/>
       </p:ext>
     </p:extLst>
   </p:cSld>
@@ -7910,7 +7929,7 @@
           <a:p>
             <a:r>
               <a:rPr lang="en-US" b="1" dirty="0" smtClean="0"/>
-              <a:t>Demo</a:t>
+              <a:t>Huh?</a:t>
             </a:r>
             <a:endParaRPr lang="en-US" b="1" dirty="0"/>
           </a:p>
@@ -7941,7 +7960,7 @@
             </a:pPr>
             <a:r>
               <a:rPr lang="en-US" sz="4800" b="1" dirty="0" smtClean="0"/>
-              <a:t>Enough slides, let’s code.</a:t>
+              <a:t>Huh?</a:t>
             </a:r>
             <a:endParaRPr lang="en-US" sz="2800" b="1" dirty="0" smtClean="0"/>
           </a:p>
@@ -7950,7 +7969,7 @@
     </p:spTree>
     <p:extLst>
       <p:ext uri="{BB962C8B-B14F-4D97-AF65-F5344CB8AC3E}">
-        <p14:creationId xmlns:p14="http://schemas.microsoft.com/office/powerpoint/2010/main" val="2921785292"/>
+        <p14:creationId xmlns:p14="http://schemas.microsoft.com/office/powerpoint/2010/main" val="955297497"/>
       </p:ext>
     </p:extLst>
   </p:cSld>
@@ -7997,6 +8016,105 @@
             <p:ph type="title"/>
           </p:nvPr>
         </p:nvSpPr>
+        <p:spPr>
+          <a:xfrm>
+            <a:off x="381000" y="171450"/>
+            <a:ext cx="8382000" cy="769441"/>
+          </a:xfrm>
+        </p:spPr>
+        <p:txBody>
+          <a:bodyPr/>
+          <a:lstStyle/>
+          <a:p>
+            <a:r>
+              <a:rPr lang="en-US" b="1" dirty="0" smtClean="0"/>
+              <a:t>Demo</a:t>
+            </a:r>
+            <a:endParaRPr lang="en-US" b="1" dirty="0"/>
+          </a:p>
+        </p:txBody>
+      </p:sp>
+      <p:sp>
+        <p:nvSpPr>
+          <p:cNvPr id="3" name="Content Placeholder 2"/>
+          <p:cNvSpPr>
+            <a:spLocks noGrp="1"/>
+          </p:cNvSpPr>
+          <p:nvPr>
+            <p:ph idx="1"/>
+          </p:nvPr>
+        </p:nvSpPr>
+        <p:spPr>
+          <a:xfrm>
+            <a:off x="366714" y="2283210"/>
+            <a:ext cx="8410575" cy="769441"/>
+          </a:xfrm>
+        </p:spPr>
+        <p:txBody>
+          <a:bodyPr/>
+          <a:lstStyle/>
+          <a:p>
+            <a:pPr algn="ctr">
+              <a:buNone/>
+            </a:pPr>
+            <a:r>
+              <a:rPr lang="en-US" sz="4800" b="1" dirty="0" smtClean="0"/>
+              <a:t>Enough slides, let’s code.</a:t>
+            </a:r>
+            <a:endParaRPr lang="en-US" sz="2800" b="1" dirty="0" smtClean="0"/>
+          </a:p>
+        </p:txBody>
+      </p:sp>
+    </p:spTree>
+    <p:extLst>
+      <p:ext uri="{BB962C8B-B14F-4D97-AF65-F5344CB8AC3E}">
+        <p14:creationId xmlns:p14="http://schemas.microsoft.com/office/powerpoint/2010/main" val="2921785292"/>
+      </p:ext>
+    </p:extLst>
+  </p:cSld>
+  <p:clrMapOvr>
+    <a:masterClrMapping/>
+  </p:clrMapOvr>
+  <p:transition>
+    <p:fade/>
+  </p:transition>
+  <p:timing>
+    <p:tnLst>
+      <p:par>
+        <p:cTn id="1" dur="indefinite" restart="never" nodeType="tmRoot"/>
+      </p:par>
+    </p:tnLst>
+  </p:timing>
+</p:sld>
+</file>
+
+<file path=ppt/slides/slide17.xml><?xml version="1.0" encoding="utf-8"?>
+<p:sld xmlns:a="http://schemas.openxmlformats.org/drawingml/2006/main" xmlns:r="http://schemas.openxmlformats.org/officeDocument/2006/relationships" xmlns:p="http://schemas.openxmlformats.org/presentationml/2006/main">
+  <p:cSld>
+    <p:spTree>
+      <p:nvGrpSpPr>
+        <p:cNvPr id="1" name=""/>
+        <p:cNvGrpSpPr/>
+        <p:nvPr/>
+      </p:nvGrpSpPr>
+      <p:grpSpPr>
+        <a:xfrm>
+          <a:off x="0" y="0"/>
+          <a:ext cx="0" cy="0"/>
+          <a:chOff x="0" y="0"/>
+          <a:chExt cx="0" cy="0"/>
+        </a:xfrm>
+      </p:grpSpPr>
+      <p:sp>
+        <p:nvSpPr>
+          <p:cNvPr id="2" name="Title 1"/>
+          <p:cNvSpPr>
+            <a:spLocks noGrp="1"/>
+          </p:cNvSpPr>
+          <p:nvPr>
+            <p:ph type="title"/>
+          </p:nvPr>
+        </p:nvSpPr>
         <p:spPr/>
         <p:txBody>
           <a:bodyPr/>
@@ -8129,29 +8247,16 @@
             </a:pPr>
             <a:r>
               <a:rPr lang="en-US" b="1" i="1" dirty="0" smtClean="0"/>
-              <a:t>Get a basic understanding of </a:t>
-            </a:r>
+              <a:t>Get a basic understanding of open source tooling that helps YOUR security solution.</a:t>
+            </a:r>
+          </a:p>
+          <a:p>
+            <a:pPr marL="0" indent="0">
+              <a:buNone/>
+            </a:pPr>
             <a:r>
               <a:rPr lang="en-US" b="1" i="1" dirty="0" smtClean="0"/>
-              <a:t>open source tooling that helps YOUR security solution</a:t>
-            </a:r>
-            <a:r>
-              <a:rPr lang="en-US" b="1" i="1" dirty="0" smtClean="0"/>
-              <a:t>.</a:t>
-            </a:r>
-            <a:endParaRPr lang="en-US" b="1" i="1" dirty="0" smtClean="0"/>
-          </a:p>
-          <a:p>
-            <a:pPr marL="0" indent="0">
-              <a:buNone/>
-            </a:pPr>
-            <a:r>
-              <a:rPr lang="en-US" b="1" i="1" dirty="0" smtClean="0"/>
-              <a:t>Spark ideas about what you </a:t>
-            </a:r>
-            <a:r>
-              <a:rPr lang="en-US" b="1" i="1" dirty="0" smtClean="0"/>
-              <a:t>add to your application to make user authentication easier and simple.</a:t>
+              <a:t>Spark ideas about what you add to your application to make user authentication easier and simple.</a:t>
             </a:r>
             <a:endParaRPr lang="en-US" b="1" i="1" dirty="0"/>
           </a:p>
@@ -8207,14 +8312,19 @@
             <p:ph type="title"/>
           </p:nvPr>
         </p:nvSpPr>
-        <p:spPr/>
+        <p:spPr>
+          <a:xfrm>
+            <a:off x="381000" y="171450"/>
+            <a:ext cx="8382000" cy="769441"/>
+          </a:xfrm>
+        </p:spPr>
         <p:txBody>
           <a:bodyPr/>
           <a:lstStyle/>
           <a:p>
             <a:r>
               <a:rPr lang="en-US" b="1" dirty="0" smtClean="0"/>
-              <a:t>Agenda</a:t>
+              <a:t>Caveat</a:t>
             </a:r>
             <a:endParaRPr lang="en-US" b="1" dirty="0"/>
           </a:p>
@@ -8232,29 +8342,44 @@
         </p:nvSpPr>
         <p:spPr>
           <a:xfrm>
-            <a:off x="381003" y="1063228"/>
-            <a:ext cx="8410575" cy="1126462"/>
+            <a:off x="366714" y="1647651"/>
+            <a:ext cx="8410575" cy="2012859"/>
           </a:xfrm>
         </p:spPr>
         <p:txBody>
           <a:bodyPr/>
           <a:lstStyle/>
           <a:p>
-            <a:r>
-              <a:rPr lang="en-US" dirty="0" smtClean="0"/>
-              <a:t>Quick Overview</a:t>
-            </a:r>
-            <a:endParaRPr lang="en-US" dirty="0" smtClean="0"/>
-          </a:p>
-          <a:p>
-            <a:r>
-              <a:rPr lang="en-US" dirty="0" smtClean="0"/>
-              <a:t>Demos, Demos, Demos!</a:t>
-            </a:r>
+            <a:pPr marL="0" indent="0">
+              <a:buNone/>
+            </a:pPr>
+            <a:r>
+              <a:rPr lang="en-US" b="1" i="1" dirty="0" smtClean="0"/>
+              <a:t>Your mileage may vary with the topics and approaches discussed. </a:t>
+            </a:r>
+          </a:p>
+          <a:p>
+            <a:pPr marL="0" indent="0">
+              <a:buNone/>
+            </a:pPr>
+            <a:r>
+              <a:rPr lang="en-US" b="1" i="1" dirty="0" smtClean="0"/>
+              <a:t>Implementation of an SSO solution will vary depending on </a:t>
+            </a:r>
+            <a:r>
+              <a:rPr lang="en-US" b="1" i="1" smtClean="0"/>
+              <a:t>your business needs.</a:t>
+            </a:r>
+            <a:endParaRPr lang="en-US" b="1" i="1" dirty="0"/>
           </a:p>
         </p:txBody>
       </p:sp>
     </p:spTree>
+    <p:extLst>
+      <p:ext uri="{BB962C8B-B14F-4D97-AF65-F5344CB8AC3E}">
+        <p14:creationId xmlns:p14="http://schemas.microsoft.com/office/powerpoint/2010/main" val="2590314557"/>
+      </p:ext>
+    </p:extLst>
   </p:cSld>
   <p:clrMapOvr>
     <a:masterClrMapping/>
@@ -8306,6 +8431,97 @@
           <a:p>
             <a:r>
               <a:rPr lang="en-US" b="1" dirty="0" smtClean="0"/>
+              <a:t>Agenda</a:t>
+            </a:r>
+            <a:endParaRPr lang="en-US" b="1" dirty="0"/>
+          </a:p>
+        </p:txBody>
+      </p:sp>
+      <p:sp>
+        <p:nvSpPr>
+          <p:cNvPr id="3" name="Content Placeholder 2"/>
+          <p:cNvSpPr>
+            <a:spLocks noGrp="1"/>
+          </p:cNvSpPr>
+          <p:nvPr>
+            <p:ph idx="1"/>
+          </p:nvPr>
+        </p:nvSpPr>
+        <p:spPr>
+          <a:xfrm>
+            <a:off x="381003" y="1063228"/>
+            <a:ext cx="8410575" cy="1126462"/>
+          </a:xfrm>
+        </p:spPr>
+        <p:txBody>
+          <a:bodyPr/>
+          <a:lstStyle/>
+          <a:p>
+            <a:r>
+              <a:rPr lang="en-US" dirty="0" smtClean="0"/>
+              <a:t>Quick Overview</a:t>
+            </a:r>
+          </a:p>
+          <a:p>
+            <a:r>
+              <a:rPr lang="en-US" dirty="0" smtClean="0"/>
+              <a:t>Demos, Demos, Demos!</a:t>
+            </a:r>
+          </a:p>
+        </p:txBody>
+      </p:sp>
+    </p:spTree>
+  </p:cSld>
+  <p:clrMapOvr>
+    <a:masterClrMapping/>
+  </p:clrMapOvr>
+  <p:transition>
+    <p:fade/>
+  </p:transition>
+  <p:timing>
+    <p:tnLst>
+      <p:par>
+        <p:cTn id="1" dur="indefinite" restart="never" nodeType="tmRoot"/>
+      </p:par>
+    </p:tnLst>
+  </p:timing>
+</p:sld>
+</file>
+
+<file path=ppt/slides/slide5.xml><?xml version="1.0" encoding="utf-8"?>
+<p:sld xmlns:a="http://schemas.openxmlformats.org/drawingml/2006/main" xmlns:r="http://schemas.openxmlformats.org/officeDocument/2006/relationships" xmlns:p="http://schemas.openxmlformats.org/presentationml/2006/main">
+  <p:cSld>
+    <p:spTree>
+      <p:nvGrpSpPr>
+        <p:cNvPr id="1" name=""/>
+        <p:cNvGrpSpPr/>
+        <p:nvPr/>
+      </p:nvGrpSpPr>
+      <p:grpSpPr>
+        <a:xfrm>
+          <a:off x="0" y="0"/>
+          <a:ext cx="0" cy="0"/>
+          <a:chOff x="0" y="0"/>
+          <a:chExt cx="0" cy="0"/>
+        </a:xfrm>
+      </p:grpSpPr>
+      <p:sp>
+        <p:nvSpPr>
+          <p:cNvPr id="2" name="Title 1"/>
+          <p:cNvSpPr>
+            <a:spLocks noGrp="1"/>
+          </p:cNvSpPr>
+          <p:nvPr>
+            <p:ph type="title"/>
+          </p:nvPr>
+        </p:nvSpPr>
+        <p:spPr/>
+        <p:txBody>
+          <a:bodyPr/>
+          <a:lstStyle/>
+          <a:p>
+            <a:r>
+              <a:rPr lang="en-US" b="1" dirty="0" smtClean="0"/>
               <a:t>Info</a:t>
             </a:r>
             <a:endParaRPr lang="en-US" b="1" dirty="0"/>
@@ -8556,7 +8772,7 @@
 </p:sld>
 </file>
 
-<file path=ppt/slides/slide5.xml><?xml version="1.0" encoding="utf-8"?>
+<file path=ppt/slides/slide6.xml><?xml version="1.0" encoding="utf-8"?>
 <p:sld xmlns:a="http://schemas.openxmlformats.org/drawingml/2006/main" xmlns:r="http://schemas.openxmlformats.org/officeDocument/2006/relationships" xmlns:p="http://schemas.openxmlformats.org/presentationml/2006/main">
   <p:cSld>
     <p:spTree>
@@ -8972,7 +9188,7 @@
 </p:sld>
 </file>
 
-<file path=ppt/slides/slide6.xml><?xml version="1.0" encoding="utf-8"?>
+<file path=ppt/slides/slide7.xml><?xml version="1.0" encoding="utf-8"?>
 <p:sld xmlns:a="http://schemas.openxmlformats.org/drawingml/2006/main" xmlns:r="http://schemas.openxmlformats.org/officeDocument/2006/relationships" xmlns:p="http://schemas.openxmlformats.org/presentationml/2006/main">
   <p:cSld>
     <p:spTree>
@@ -9104,157 +9320,6 @@
     <p:extLst>
       <p:ext uri="{BB962C8B-B14F-4D97-AF65-F5344CB8AC3E}">
         <p14:creationId xmlns:p14="http://schemas.microsoft.com/office/powerpoint/2010/main" val="922410469"/>
-      </p:ext>
-    </p:extLst>
-  </p:cSld>
-  <p:clrMapOvr>
-    <a:masterClrMapping/>
-  </p:clrMapOvr>
-  <p:transition>
-    <p:fade/>
-  </p:transition>
-  <p:timing>
-    <p:tnLst>
-      <p:par>
-        <p:cTn id="1" dur="indefinite" restart="never" nodeType="tmRoot"/>
-      </p:par>
-    </p:tnLst>
-  </p:timing>
-</p:sld>
-</file>
-
-<file path=ppt/slides/slide7.xml><?xml version="1.0" encoding="utf-8"?>
-<p:sld xmlns:a="http://schemas.openxmlformats.org/drawingml/2006/main" xmlns:r="http://schemas.openxmlformats.org/officeDocument/2006/relationships" xmlns:p="http://schemas.openxmlformats.org/presentationml/2006/main">
-  <p:cSld>
-    <p:spTree>
-      <p:nvGrpSpPr>
-        <p:cNvPr id="1" name=""/>
-        <p:cNvGrpSpPr/>
-        <p:nvPr/>
-      </p:nvGrpSpPr>
-      <p:grpSpPr>
-        <a:xfrm>
-          <a:off x="0" y="0"/>
-          <a:ext cx="0" cy="0"/>
-          <a:chOff x="0" y="0"/>
-          <a:chExt cx="0" cy="0"/>
-        </a:xfrm>
-      </p:grpSpPr>
-      <p:sp>
-        <p:nvSpPr>
-          <p:cNvPr id="2" name="Title 1"/>
-          <p:cNvSpPr>
-            <a:spLocks noGrp="1"/>
-          </p:cNvSpPr>
-          <p:nvPr>
-            <p:ph type="title"/>
-          </p:nvPr>
-        </p:nvSpPr>
-        <p:spPr/>
-        <p:txBody>
-          <a:bodyPr/>
-          <a:lstStyle/>
-          <a:p>
-            <a:r>
-              <a:rPr lang="en-US" b="1" dirty="0" smtClean="0"/>
-              <a:t>Authentication Flow</a:t>
-            </a:r>
-            <a:endParaRPr lang="en-US" b="1" dirty="0"/>
-          </a:p>
-        </p:txBody>
-      </p:sp>
-      <p:pic>
-        <p:nvPicPr>
-          <p:cNvPr id="4" name="Content Placeholder 3"/>
-          <p:cNvPicPr>
-            <a:picLocks noGrp="1" noChangeAspect="1"/>
-          </p:cNvPicPr>
-          <p:nvPr>
-            <p:ph idx="1"/>
-          </p:nvPr>
-        </p:nvPicPr>
-        <p:blipFill>
-          <a:blip r:embed="rId2">
-            <a:extLst>
-              <a:ext uri="{28A0092B-C50C-407E-A947-70E740481C1C}">
-                <a14:useLocalDpi xmlns:a14="http://schemas.microsoft.com/office/drawing/2010/main" val="0"/>
-              </a:ext>
-            </a:extLst>
-          </a:blip>
-          <a:stretch>
-            <a:fillRect/>
-          </a:stretch>
-        </p:blipFill>
-        <p:spPr>
-          <a:xfrm>
-            <a:off x="3074084" y="1317780"/>
-            <a:ext cx="2995833" cy="2507941"/>
-          </a:xfrm>
-        </p:spPr>
-      </p:pic>
-      <p:sp>
-        <p:nvSpPr>
-          <p:cNvPr id="5" name="TextBox 4"/>
-          <p:cNvSpPr txBox="1"/>
-          <p:nvPr/>
-        </p:nvSpPr>
-        <p:spPr>
-          <a:xfrm>
-            <a:off x="2122579" y="4411469"/>
-            <a:ext cx="4898842" cy="275460"/>
-          </a:xfrm>
-          <a:prstGeom prst="rect">
-            <a:avLst/>
-          </a:prstGeom>
-          <a:noFill/>
-        </p:spPr>
-        <p:txBody>
-          <a:bodyPr wrap="none" rtlCol="0">
-            <a:spAutoFit/>
-          </a:bodyPr>
-          <a:lstStyle/>
-          <a:p>
-            <a:r>
-              <a:rPr lang="en-US" sz="1400" i="1" dirty="0"/>
-              <a:t>http://www.dancing4beginners.com/rumba-dance-steps.htm</a:t>
-            </a:r>
-          </a:p>
-        </p:txBody>
-      </p:sp>
-      <p:sp>
-        <p:nvSpPr>
-          <p:cNvPr id="6" name="TextBox 5"/>
-          <p:cNvSpPr txBox="1"/>
-          <p:nvPr/>
-        </p:nvSpPr>
-        <p:spPr>
-          <a:xfrm>
-            <a:off x="3506549" y="3943350"/>
-            <a:ext cx="2130904" cy="353943"/>
-          </a:xfrm>
-          <a:prstGeom prst="rect">
-            <a:avLst/>
-          </a:prstGeom>
-          <a:noFill/>
-        </p:spPr>
-        <p:txBody>
-          <a:bodyPr wrap="none" rtlCol="0">
-            <a:spAutoFit/>
-          </a:bodyPr>
-          <a:lstStyle/>
-          <a:p>
-            <a:r>
-              <a:rPr lang="en-US" dirty="0" smtClean="0"/>
-              <a:t>Rumba (Women)</a:t>
-            </a:r>
-            <a:endParaRPr lang="en-US" dirty="0"/>
-          </a:p>
-        </p:txBody>
-      </p:sp>
-    </p:spTree>
-    <p:extLst>
-      <p:ext uri="{BB962C8B-B14F-4D97-AF65-F5344CB8AC3E}">
-        <p14:creationId xmlns:p14="http://schemas.microsoft.com/office/powerpoint/2010/main" val="1744842789"/>
       </p:ext>
     </p:extLst>
   </p:cSld>
@@ -9314,88 +9379,98 @@
           </a:p>
         </p:txBody>
       </p:sp>
-      <p:sp>
-        <p:nvSpPr>
-          <p:cNvPr id="3" name="Content Placeholder 2"/>
-          <p:cNvSpPr>
-            <a:spLocks noGrp="1"/>
-          </p:cNvSpPr>
+      <p:pic>
+        <p:nvPicPr>
+          <p:cNvPr id="4" name="Content Placeholder 3"/>
+          <p:cNvPicPr>
+            <a:picLocks noGrp="1" noChangeAspect="1"/>
+          </p:cNvPicPr>
           <p:nvPr>
             <p:ph idx="1"/>
           </p:nvPr>
-        </p:nvSpPr>
+        </p:nvPicPr>
+        <p:blipFill>
+          <a:blip r:embed="rId2">
+            <a:extLst>
+              <a:ext uri="{28A0092B-C50C-407E-A947-70E740481C1C}">
+                <a14:useLocalDpi xmlns:a14="http://schemas.microsoft.com/office/drawing/2010/main" val="0"/>
+              </a:ext>
+            </a:extLst>
+          </a:blip>
+          <a:stretch>
+            <a:fillRect/>
+          </a:stretch>
+        </p:blipFill>
         <p:spPr>
           <a:xfrm>
-            <a:off x="381003" y="1063228"/>
-            <a:ext cx="8410575" cy="2862322"/>
+            <a:off x="3074084" y="1317780"/>
+            <a:ext cx="2995833" cy="2507941"/>
           </a:xfrm>
         </p:spPr>
-        <p:txBody>
-          <a:bodyPr/>
+      </p:pic>
+      <p:sp>
+        <p:nvSpPr>
+          <p:cNvPr id="5" name="TextBox 4"/>
+          <p:cNvSpPr txBox="1"/>
+          <p:nvPr/>
+        </p:nvSpPr>
+        <p:spPr>
+          <a:xfrm>
+            <a:off x="2122579" y="4411469"/>
+            <a:ext cx="4898842" cy="275460"/>
+          </a:xfrm>
+          <a:prstGeom prst="rect">
+            <a:avLst/>
+          </a:prstGeom>
+          <a:noFill/>
+        </p:spPr>
+        <p:txBody>
+          <a:bodyPr wrap="none" rtlCol="0">
+            <a:spAutoFit/>
+          </a:bodyPr>
           <a:lstStyle/>
           <a:p>
             <a:r>
+              <a:rPr lang="en-US" sz="1400" i="1" dirty="0"/>
+              <a:t>http://www.dancing4beginners.com/rumba-dance-steps.htm</a:t>
+            </a:r>
+          </a:p>
+        </p:txBody>
+      </p:sp>
+      <p:sp>
+        <p:nvSpPr>
+          <p:cNvPr id="6" name="TextBox 5"/>
+          <p:cNvSpPr txBox="1"/>
+          <p:nvPr/>
+        </p:nvSpPr>
+        <p:spPr>
+          <a:xfrm>
+            <a:off x="3506549" y="3943350"/>
+            <a:ext cx="2130904" cy="353943"/>
+          </a:xfrm>
+          <a:prstGeom prst="rect">
+            <a:avLst/>
+          </a:prstGeom>
+          <a:noFill/>
+        </p:spPr>
+        <p:txBody>
+          <a:bodyPr wrap="none" rtlCol="0">
+            <a:spAutoFit/>
+          </a:bodyPr>
+          <a:lstStyle/>
+          <a:p>
+            <a:r>
               <a:rPr lang="en-US" dirty="0" smtClean="0"/>
-              <a:t>OAuth 2</a:t>
-            </a:r>
-          </a:p>
-          <a:p>
-            <a:pPr lvl="1"/>
-            <a:r>
-              <a:rPr lang="en-US" dirty="0" smtClean="0">
-                <a:effectLst/>
-              </a:rPr>
-              <a:t>Delegation protocol for authorization decisions</a:t>
-            </a:r>
-          </a:p>
-          <a:p>
-            <a:pPr lvl="1"/>
-            <a:r>
-              <a:rPr lang="en-US" dirty="0" smtClean="0">
-                <a:effectLst/>
-              </a:rPr>
-              <a:t>Allows issuance of access </a:t>
-            </a:r>
-            <a:r>
-              <a:rPr lang="en-US" dirty="0">
-                <a:effectLst/>
-              </a:rPr>
-              <a:t>tokens </a:t>
-            </a:r>
-            <a:r>
-              <a:rPr lang="en-US" dirty="0" smtClean="0">
-                <a:effectLst/>
-              </a:rPr>
-              <a:t>to </a:t>
-            </a:r>
-            <a:r>
-              <a:rPr lang="en-US" dirty="0">
-                <a:effectLst/>
-              </a:rPr>
-              <a:t>third-party clients </a:t>
-            </a:r>
-            <a:r>
-              <a:rPr lang="en-US" dirty="0" smtClean="0">
-                <a:effectLst/>
-              </a:rPr>
-              <a:t>once approved by an owner (user)</a:t>
-            </a:r>
-          </a:p>
-          <a:p>
-            <a:pPr lvl="1"/>
-            <a:r>
-              <a:rPr lang="en-US" dirty="0" smtClean="0">
-                <a:effectLst/>
-              </a:rPr>
-              <a:t>Access tokens grant (limited) access to owner resources (pictures, timeline, tweets, etc.)</a:t>
-            </a:r>
+              <a:t>Rumba (Women)</a:t>
+            </a:r>
+            <a:endParaRPr lang="en-US" dirty="0"/>
           </a:p>
         </p:txBody>
       </p:sp>
     </p:spTree>
     <p:extLst>
       <p:ext uri="{BB962C8B-B14F-4D97-AF65-F5344CB8AC3E}">
-        <p14:creationId xmlns:p14="http://schemas.microsoft.com/office/powerpoint/2010/main" val="230671296"/>
+        <p14:creationId xmlns:p14="http://schemas.microsoft.com/office/powerpoint/2010/main" val="1744842789"/>
       </p:ext>
     </p:extLst>
   </p:cSld>
@@ -9468,51 +9543,75 @@
         <p:spPr>
           <a:xfrm>
             <a:off x="381003" y="1063228"/>
-            <a:ext cx="8410575" cy="2160591"/>
+            <a:ext cx="8410575" cy="2862322"/>
           </a:xfrm>
         </p:spPr>
         <p:txBody>
           <a:bodyPr/>
           <a:lstStyle/>
           <a:p>
+            <a:r>
+              <a:rPr lang="en-US" dirty="0" smtClean="0"/>
+              <a:t>OAuth 2</a:t>
+            </a:r>
+          </a:p>
+          <a:p>
+            <a:pPr lvl="1"/>
+            <a:r>
+              <a:rPr lang="en-US" dirty="0" smtClean="0">
+                <a:effectLst/>
+              </a:rPr>
+              <a:t>Delegation protocol for authorization decisions</a:t>
+            </a:r>
+          </a:p>
+          <a:p>
+            <a:pPr lvl="1"/>
+            <a:r>
+              <a:rPr lang="en-US" dirty="0" smtClean="0">
+                <a:effectLst/>
+              </a:rPr>
+              <a:t>Allows issuance of access </a:t>
+            </a:r>
             <a:r>
               <a:rPr lang="en-US" dirty="0">
                 <a:effectLst/>
               </a:rPr>
-              <a:t> </a:t>
-            </a:r>
-            <a:r>
-              <a:rPr lang="en-US" dirty="0"/>
-              <a:t>OpenID Connect</a:t>
+              <a:t>tokens </a:t>
+            </a:r>
+            <a:r>
+              <a:rPr lang="en-US" dirty="0" smtClean="0">
+                <a:effectLst/>
+              </a:rPr>
+              <a:t>to </a:t>
+            </a:r>
+            <a:r>
+              <a:rPr lang="en-US" dirty="0">
+                <a:effectLst/>
+              </a:rPr>
+              <a:t>third-party clients </a:t>
+            </a:r>
+            <a:r>
+              <a:rPr lang="en-US" dirty="0" smtClean="0">
+                <a:effectLst/>
+              </a:rPr>
+              <a:t>once approved by an owner (user)</a:t>
             </a:r>
           </a:p>
           <a:p>
             <a:pPr lvl="1"/>
             <a:r>
-              <a:rPr lang="en-US" dirty="0" smtClean="0"/>
-              <a:t>Uses OAuth 2 flow</a:t>
-            </a:r>
-          </a:p>
-          <a:p>
-            <a:pPr lvl="1"/>
-            <a:r>
-              <a:rPr lang="en-US" dirty="0" smtClean="0"/>
-              <a:t>Adds </a:t>
-            </a:r>
-            <a:r>
-              <a:rPr lang="en-US" dirty="0"/>
-              <a:t>User Information exchange via claims</a:t>
-            </a:r>
-          </a:p>
-          <a:p>
-            <a:endParaRPr lang="en-US" dirty="0"/>
+              <a:rPr lang="en-US" dirty="0" smtClean="0">
+                <a:effectLst/>
+              </a:rPr>
+              <a:t>Access tokens grant (limited) access to owner resources (pictures, timeline, tweets, etc.)</a:t>
+            </a:r>
           </a:p>
         </p:txBody>
       </p:sp>
     </p:spTree>
     <p:extLst>
       <p:ext uri="{BB962C8B-B14F-4D97-AF65-F5344CB8AC3E}">
-        <p14:creationId xmlns:p14="http://schemas.microsoft.com/office/powerpoint/2010/main" val="34081150"/>
+        <p14:creationId xmlns:p14="http://schemas.microsoft.com/office/powerpoint/2010/main" val="230671296"/>
       </p:ext>
     </p:extLst>
   </p:cSld>

</xml_diff>

<commit_message>
Removed the Project_Readme files from the remaining projects Re-saved the PPT
</commit_message>
<xml_diff>
--- a/slides/AspNetWebSecurity.pptx
+++ b/slides/AspNetWebSecurity.pptx
@@ -15,8 +15,8 @@
     <p:sldId id="676" r:id="rId3"/>
     <p:sldId id="700" r:id="rId4"/>
     <p:sldId id="715" r:id="rId5"/>
-    <p:sldId id="677" r:id="rId6"/>
-    <p:sldId id="701" r:id="rId7"/>
+    <p:sldId id="701" r:id="rId6"/>
+    <p:sldId id="677" r:id="rId7"/>
     <p:sldId id="705" r:id="rId8"/>
     <p:sldId id="708" r:id="rId9"/>
     <p:sldId id="709" r:id="rId10"/>
@@ -8364,11 +8364,7 @@
             </a:pPr>
             <a:r>
               <a:rPr lang="en-US" b="1" i="1" dirty="0" smtClean="0"/>
-              <a:t>Implementation of an SSO solution will vary depending on </a:t>
-            </a:r>
-            <a:r>
-              <a:rPr lang="en-US" b="1" i="1" smtClean="0"/>
-              <a:t>your business needs.</a:t>
+              <a:t>Implementation of an SSO solution will vary depending on your business needs.</a:t>
             </a:r>
             <a:endParaRPr lang="en-US" b="1" i="1" dirty="0"/>
           </a:p>
@@ -8431,97 +8427,6 @@
           <a:p>
             <a:r>
               <a:rPr lang="en-US" b="1" dirty="0" smtClean="0"/>
-              <a:t>Agenda</a:t>
-            </a:r>
-            <a:endParaRPr lang="en-US" b="1" dirty="0"/>
-          </a:p>
-        </p:txBody>
-      </p:sp>
-      <p:sp>
-        <p:nvSpPr>
-          <p:cNvPr id="3" name="Content Placeholder 2"/>
-          <p:cNvSpPr>
-            <a:spLocks noGrp="1"/>
-          </p:cNvSpPr>
-          <p:nvPr>
-            <p:ph idx="1"/>
-          </p:nvPr>
-        </p:nvSpPr>
-        <p:spPr>
-          <a:xfrm>
-            <a:off x="381003" y="1063228"/>
-            <a:ext cx="8410575" cy="1126462"/>
-          </a:xfrm>
-        </p:spPr>
-        <p:txBody>
-          <a:bodyPr/>
-          <a:lstStyle/>
-          <a:p>
-            <a:r>
-              <a:rPr lang="en-US" dirty="0" smtClean="0"/>
-              <a:t>Quick Overview</a:t>
-            </a:r>
-          </a:p>
-          <a:p>
-            <a:r>
-              <a:rPr lang="en-US" dirty="0" smtClean="0"/>
-              <a:t>Demos, Demos, Demos!</a:t>
-            </a:r>
-          </a:p>
-        </p:txBody>
-      </p:sp>
-    </p:spTree>
-  </p:cSld>
-  <p:clrMapOvr>
-    <a:masterClrMapping/>
-  </p:clrMapOvr>
-  <p:transition>
-    <p:fade/>
-  </p:transition>
-  <p:timing>
-    <p:tnLst>
-      <p:par>
-        <p:cTn id="1" dur="indefinite" restart="never" nodeType="tmRoot"/>
-      </p:par>
-    </p:tnLst>
-  </p:timing>
-</p:sld>
-</file>
-
-<file path=ppt/slides/slide5.xml><?xml version="1.0" encoding="utf-8"?>
-<p:sld xmlns:a="http://schemas.openxmlformats.org/drawingml/2006/main" xmlns:r="http://schemas.openxmlformats.org/officeDocument/2006/relationships" xmlns:p="http://schemas.openxmlformats.org/presentationml/2006/main">
-  <p:cSld>
-    <p:spTree>
-      <p:nvGrpSpPr>
-        <p:cNvPr id="1" name=""/>
-        <p:cNvGrpSpPr/>
-        <p:nvPr/>
-      </p:nvGrpSpPr>
-      <p:grpSpPr>
-        <a:xfrm>
-          <a:off x="0" y="0"/>
-          <a:ext cx="0" cy="0"/>
-          <a:chOff x="0" y="0"/>
-          <a:chExt cx="0" cy="0"/>
-        </a:xfrm>
-      </p:grpSpPr>
-      <p:sp>
-        <p:nvSpPr>
-          <p:cNvPr id="2" name="Title 1"/>
-          <p:cNvSpPr>
-            <a:spLocks noGrp="1"/>
-          </p:cNvSpPr>
-          <p:nvPr>
-            <p:ph type="title"/>
-          </p:nvPr>
-        </p:nvSpPr>
-        <p:spPr/>
-        <p:txBody>
-          <a:bodyPr/>
-          <a:lstStyle/>
-          <a:p>
-            <a:r>
-              <a:rPr lang="en-US" b="1" dirty="0" smtClean="0"/>
               <a:t>Info</a:t>
             </a:r>
             <a:endParaRPr lang="en-US" b="1" dirty="0"/>
@@ -8762,6 +8667,97 @@
       </p:transition>
     </mc:Fallback>
   </mc:AlternateContent>
+  <p:timing>
+    <p:tnLst>
+      <p:par>
+        <p:cTn id="1" dur="indefinite" restart="never" nodeType="tmRoot"/>
+      </p:par>
+    </p:tnLst>
+  </p:timing>
+</p:sld>
+</file>
+
+<file path=ppt/slides/slide5.xml><?xml version="1.0" encoding="utf-8"?>
+<p:sld xmlns:a="http://schemas.openxmlformats.org/drawingml/2006/main" xmlns:r="http://schemas.openxmlformats.org/officeDocument/2006/relationships" xmlns:p="http://schemas.openxmlformats.org/presentationml/2006/main">
+  <p:cSld>
+    <p:spTree>
+      <p:nvGrpSpPr>
+        <p:cNvPr id="1" name=""/>
+        <p:cNvGrpSpPr/>
+        <p:nvPr/>
+      </p:nvGrpSpPr>
+      <p:grpSpPr>
+        <a:xfrm>
+          <a:off x="0" y="0"/>
+          <a:ext cx="0" cy="0"/>
+          <a:chOff x="0" y="0"/>
+          <a:chExt cx="0" cy="0"/>
+        </a:xfrm>
+      </p:grpSpPr>
+      <p:sp>
+        <p:nvSpPr>
+          <p:cNvPr id="2" name="Title 1"/>
+          <p:cNvSpPr>
+            <a:spLocks noGrp="1"/>
+          </p:cNvSpPr>
+          <p:nvPr>
+            <p:ph type="title"/>
+          </p:nvPr>
+        </p:nvSpPr>
+        <p:spPr/>
+        <p:txBody>
+          <a:bodyPr/>
+          <a:lstStyle/>
+          <a:p>
+            <a:r>
+              <a:rPr lang="en-US" b="1" dirty="0" smtClean="0"/>
+              <a:t>Agenda</a:t>
+            </a:r>
+            <a:endParaRPr lang="en-US" b="1" dirty="0"/>
+          </a:p>
+        </p:txBody>
+      </p:sp>
+      <p:sp>
+        <p:nvSpPr>
+          <p:cNvPr id="3" name="Content Placeholder 2"/>
+          <p:cNvSpPr>
+            <a:spLocks noGrp="1"/>
+          </p:cNvSpPr>
+          <p:nvPr>
+            <p:ph idx="1"/>
+          </p:nvPr>
+        </p:nvSpPr>
+        <p:spPr>
+          <a:xfrm>
+            <a:off x="381003" y="1063228"/>
+            <a:ext cx="8410575" cy="1126462"/>
+          </a:xfrm>
+        </p:spPr>
+        <p:txBody>
+          <a:bodyPr/>
+          <a:lstStyle/>
+          <a:p>
+            <a:r>
+              <a:rPr lang="en-US" dirty="0" smtClean="0"/>
+              <a:t>Quick Overview</a:t>
+            </a:r>
+          </a:p>
+          <a:p>
+            <a:r>
+              <a:rPr lang="en-US" dirty="0" smtClean="0"/>
+              <a:t>Demos, Demos, Demos!</a:t>
+            </a:r>
+          </a:p>
+        </p:txBody>
+      </p:sp>
+    </p:spTree>
+  </p:cSld>
+  <p:clrMapOvr>
+    <a:masterClrMapping/>
+  </p:clrMapOvr>
+  <p:transition>
+    <p:fade/>
+  </p:transition>
   <p:timing>
     <p:tnLst>
       <p:par>

</xml_diff>

<commit_message>
Basic changes for the demos
</commit_message>
<xml_diff>
--- a/slides/AspNetWebSecurity.pptx
+++ b/slides/AspNetWebSecurity.pptx
@@ -288,7 +288,7 @@
               <a:pPr>
                 <a:defRPr/>
               </a:pPr>
-              <a:t>3/17/2016 9:20 AM</a:t>
+              <a:t>4/20/2016 12:06 PM</a:t>
             </a:fld>
             <a:endParaRPr lang="en-US"/>
           </a:p>
@@ -503,7 +503,7 @@
               <a:pPr>
                 <a:defRPr/>
               </a:pPr>
-              <a:t>3/17/2016 9:20 AM</a:t>
+              <a:t>4/20/2016 12:06 PM</a:t>
             </a:fld>
             <a:endParaRPr lang="en-US"/>
           </a:p>
@@ -575,35 +575,35 @@
           <a:p>
             <a:pPr lvl="0"/>
             <a:r>
-              <a:rPr lang="en-US" noProof="0" smtClean="0"/>
+              <a:rPr lang="en-US" noProof="0"/>
               <a:t>Click to edit Master text styles</a:t>
             </a:r>
           </a:p>
           <a:p>
             <a:pPr lvl="1"/>
             <a:r>
-              <a:rPr lang="en-US" noProof="0" smtClean="0"/>
+              <a:rPr lang="en-US" noProof="0"/>
               <a:t>Second level</a:t>
             </a:r>
           </a:p>
           <a:p>
             <a:pPr lvl="2"/>
             <a:r>
-              <a:rPr lang="en-US" noProof="0" smtClean="0"/>
+              <a:rPr lang="en-US" noProof="0"/>
               <a:t>Third level</a:t>
             </a:r>
           </a:p>
           <a:p>
             <a:pPr lvl="3"/>
             <a:r>
-              <a:rPr lang="en-US" noProof="0" smtClean="0"/>
+              <a:rPr lang="en-US" noProof="0"/>
               <a:t>Fourth level</a:t>
             </a:r>
           </a:p>
           <a:p>
             <a:pPr lvl="4"/>
             <a:r>
-              <a:rPr lang="en-US" noProof="0" smtClean="0"/>
+              <a:rPr lang="en-US" noProof="0"/>
               <a:t>Fifth level</a:t>
             </a:r>
           </a:p>
@@ -908,9 +908,9 @@
             <a:fld id="{645EDAD1-88E4-4536-AD95-0BFD82EC77E6}" type="datetime8">
               <a:rPr lang="en-US" smtClean="0"/>
               <a:pPr/>
-              <a:t>3/17/2016 9:20 AM</a:t>
+              <a:t>4/20/2016 12:06 PM</a:t>
             </a:fld>
-            <a:endParaRPr lang="en-US" smtClean="0"/>
+            <a:endParaRPr lang="en-US"/>
           </a:p>
         </p:txBody>
       </p:sp>
@@ -936,7 +936,7 @@
               <a:pPr/>
               <a:t>1</a:t>
             </a:fld>
-            <a:endParaRPr lang="en-US" smtClean="0"/>
+            <a:endParaRPr lang="en-US"/>
           </a:p>
         </p:txBody>
       </p:sp>
@@ -1024,14 +1024,14 @@
               <a:defRPr/>
             </a:pPr>
             <a:r>
-              <a:rPr lang="en-US" sz="4600" b="1" smtClean="0">
+              <a:rPr lang="en-US" sz="4600" b="1">
                 <a:solidFill>
                   <a:schemeClr val="tx2"/>
                 </a:solidFill>
               </a:rPr>
               <a:t>Click to edit Master title style</a:t>
             </a:r>
-            <a:endParaRPr lang="en-US" sz="4600" b="1" dirty="0" smtClean="0">
+            <a:endParaRPr lang="en-US" sz="4600" b="1" dirty="0">
               <a:solidFill>
                 <a:schemeClr val="tx2"/>
               </a:solidFill>
@@ -1063,14 +1063,14 @@
               <a:defRPr/>
             </a:pPr>
             <a:r>
-              <a:rPr lang="en-US" smtClean="0">
+              <a:rPr lang="en-US">
                 <a:solidFill>
                   <a:schemeClr val="tx2"/>
                 </a:solidFill>
               </a:rPr>
               <a:t>Click to edit Master subtitle style</a:t>
             </a:r>
-            <a:endParaRPr lang="en-US" dirty="0" smtClean="0">
+            <a:endParaRPr lang="en-US" dirty="0">
               <a:solidFill>
                 <a:schemeClr val="tx2"/>
               </a:solidFill>
@@ -1127,10 +1127,9 @@
           <a:lstStyle/>
           <a:p>
             <a:r>
-              <a:rPr lang="en-US" smtClean="0"/>
+              <a:rPr lang="en-US"/>
               <a:t>Click to edit Master title style</a:t>
             </a:r>
-            <a:endParaRPr lang="en-US"/>
           </a:p>
         </p:txBody>
       </p:sp>
@@ -1156,38 +1155,37 @@
           <a:p>
             <a:pPr lvl="0"/>
             <a:r>
-              <a:rPr lang="en-US" smtClean="0"/>
+              <a:rPr lang="en-US"/>
               <a:t>Click to edit Master text styles</a:t>
             </a:r>
           </a:p>
           <a:p>
             <a:pPr lvl="1"/>
             <a:r>
-              <a:rPr lang="en-US" smtClean="0"/>
+              <a:rPr lang="en-US"/>
               <a:t>Second level</a:t>
             </a:r>
           </a:p>
           <a:p>
             <a:pPr lvl="2"/>
             <a:r>
-              <a:rPr lang="en-US" smtClean="0"/>
+              <a:rPr lang="en-US"/>
               <a:t>Third level</a:t>
             </a:r>
           </a:p>
           <a:p>
             <a:pPr lvl="3"/>
             <a:r>
-              <a:rPr lang="en-US" smtClean="0"/>
+              <a:rPr lang="en-US"/>
               <a:t>Fourth level</a:t>
             </a:r>
           </a:p>
           <a:p>
             <a:pPr lvl="4"/>
             <a:r>
-              <a:rPr lang="en-US" smtClean="0"/>
+              <a:rPr lang="en-US"/>
               <a:t>Fifth level</a:t>
             </a:r>
-            <a:endParaRPr lang="en-US"/>
           </a:p>
         </p:txBody>
       </p:sp>
@@ -1240,10 +1238,9 @@
           <a:lstStyle/>
           <a:p>
             <a:r>
-              <a:rPr lang="en-US" smtClean="0"/>
+              <a:rPr lang="en-US"/>
               <a:t>Click to edit Master title style</a:t>
             </a:r>
-            <a:endParaRPr lang="en-US"/>
           </a:p>
         </p:txBody>
       </p:sp>
@@ -1269,38 +1266,37 @@
           <a:p>
             <a:pPr lvl="0"/>
             <a:r>
-              <a:rPr lang="en-US" smtClean="0"/>
+              <a:rPr lang="en-US"/>
               <a:t>Click to edit Master text styles</a:t>
             </a:r>
           </a:p>
           <a:p>
             <a:pPr lvl="1"/>
             <a:r>
-              <a:rPr lang="en-US" smtClean="0"/>
+              <a:rPr lang="en-US"/>
               <a:t>Second level</a:t>
             </a:r>
           </a:p>
           <a:p>
             <a:pPr lvl="2"/>
             <a:r>
-              <a:rPr lang="en-US" smtClean="0"/>
+              <a:rPr lang="en-US"/>
               <a:t>Third level</a:t>
             </a:r>
           </a:p>
           <a:p>
             <a:pPr lvl="3"/>
             <a:r>
-              <a:rPr lang="en-US" smtClean="0"/>
+              <a:rPr lang="en-US"/>
               <a:t>Fourth level</a:t>
             </a:r>
           </a:p>
           <a:p>
             <a:pPr lvl="4"/>
             <a:r>
-              <a:rPr lang="en-US" smtClean="0"/>
+              <a:rPr lang="en-US"/>
               <a:t>Fifth level</a:t>
             </a:r>
-            <a:endParaRPr lang="en-US"/>
           </a:p>
         </p:txBody>
       </p:sp>
@@ -1353,10 +1349,9 @@
           <a:lstStyle/>
           <a:p>
             <a:r>
-              <a:rPr lang="en-US" smtClean="0"/>
+              <a:rPr lang="en-US"/>
               <a:t>Click to edit Master title style</a:t>
             </a:r>
-            <a:endParaRPr lang="en-US"/>
           </a:p>
         </p:txBody>
       </p:sp>
@@ -1418,10 +1413,9 @@
           </a:lstStyle>
           <a:p>
             <a:r>
-              <a:rPr lang="en-US" smtClean="0"/>
+              <a:rPr lang="en-US"/>
               <a:t>Click to edit Master subtitle style</a:t>
             </a:r>
-            <a:endParaRPr lang="en-US"/>
           </a:p>
         </p:txBody>
       </p:sp>
@@ -1557,10 +1551,9 @@
           <a:lstStyle/>
           <a:p>
             <a:r>
-              <a:rPr lang="en-US" smtClean="0"/>
+              <a:rPr lang="en-US"/>
               <a:t>Click to edit Master title style</a:t>
             </a:r>
-            <a:endParaRPr lang="en-US"/>
           </a:p>
         </p:txBody>
       </p:sp>
@@ -1581,38 +1574,37 @@
           <a:p>
             <a:pPr lvl="0"/>
             <a:r>
-              <a:rPr lang="en-US" smtClean="0"/>
+              <a:rPr lang="en-US"/>
               <a:t>Click to edit Master text styles</a:t>
             </a:r>
           </a:p>
           <a:p>
             <a:pPr lvl="1"/>
             <a:r>
-              <a:rPr lang="en-US" smtClean="0"/>
+              <a:rPr lang="en-US"/>
               <a:t>Second level</a:t>
             </a:r>
           </a:p>
           <a:p>
             <a:pPr lvl="2"/>
             <a:r>
-              <a:rPr lang="en-US" smtClean="0"/>
+              <a:rPr lang="en-US"/>
               <a:t>Third level</a:t>
             </a:r>
           </a:p>
           <a:p>
             <a:pPr lvl="3"/>
             <a:r>
-              <a:rPr lang="en-US" smtClean="0"/>
+              <a:rPr lang="en-US"/>
               <a:t>Fourth level</a:t>
             </a:r>
           </a:p>
           <a:p>
             <a:pPr lvl="4"/>
             <a:r>
-              <a:rPr lang="en-US" smtClean="0"/>
+              <a:rPr lang="en-US"/>
               <a:t>Fifth level</a:t>
             </a:r>
-            <a:endParaRPr lang="en-US"/>
           </a:p>
         </p:txBody>
       </p:sp>
@@ -1757,10 +1749,9 @@
           </a:lstStyle>
           <a:p>
             <a:r>
-              <a:rPr lang="en-US" smtClean="0"/>
+              <a:rPr lang="en-US"/>
               <a:t>Click to edit Master title style</a:t>
             </a:r>
-            <a:endParaRPr lang="en-US"/>
           </a:p>
         </p:txBody>
       </p:sp>
@@ -1823,7 +1814,7 @@
           <a:p>
             <a:pPr lvl="0"/>
             <a:r>
-              <a:rPr lang="en-US" smtClean="0"/>
+              <a:rPr lang="en-US"/>
               <a:t>Click to edit Master text styles</a:t>
             </a:r>
           </a:p>
@@ -1961,10 +1952,9 @@
           <a:lstStyle/>
           <a:p>
             <a:r>
-              <a:rPr lang="en-US" smtClean="0"/>
+              <a:rPr lang="en-US"/>
               <a:t>Click to edit Master title style</a:t>
             </a:r>
-            <a:endParaRPr lang="en-US"/>
           </a:p>
         </p:txBody>
       </p:sp>
@@ -2018,38 +2008,37 @@
           <a:p>
             <a:pPr lvl="0"/>
             <a:r>
-              <a:rPr lang="en-US" smtClean="0"/>
+              <a:rPr lang="en-US"/>
               <a:t>Click to edit Master text styles</a:t>
             </a:r>
           </a:p>
           <a:p>
             <a:pPr lvl="1"/>
             <a:r>
-              <a:rPr lang="en-US" smtClean="0"/>
+              <a:rPr lang="en-US"/>
               <a:t>Second level</a:t>
             </a:r>
           </a:p>
           <a:p>
             <a:pPr lvl="2"/>
             <a:r>
-              <a:rPr lang="en-US" smtClean="0"/>
+              <a:rPr lang="en-US"/>
               <a:t>Third level</a:t>
             </a:r>
           </a:p>
           <a:p>
             <a:pPr lvl="3"/>
             <a:r>
-              <a:rPr lang="en-US" smtClean="0"/>
+              <a:rPr lang="en-US"/>
               <a:t>Fourth level</a:t>
             </a:r>
           </a:p>
           <a:p>
             <a:pPr lvl="4"/>
             <a:r>
-              <a:rPr lang="en-US" smtClean="0"/>
+              <a:rPr lang="en-US"/>
               <a:t>Fifth level</a:t>
             </a:r>
-            <a:endParaRPr lang="en-US"/>
           </a:p>
         </p:txBody>
       </p:sp>
@@ -2103,38 +2092,37 @@
           <a:p>
             <a:pPr lvl="0"/>
             <a:r>
-              <a:rPr lang="en-US" smtClean="0"/>
+              <a:rPr lang="en-US"/>
               <a:t>Click to edit Master text styles</a:t>
             </a:r>
           </a:p>
           <a:p>
             <a:pPr lvl="1"/>
             <a:r>
-              <a:rPr lang="en-US" smtClean="0"/>
+              <a:rPr lang="en-US"/>
               <a:t>Second level</a:t>
             </a:r>
           </a:p>
           <a:p>
             <a:pPr lvl="2"/>
             <a:r>
-              <a:rPr lang="en-US" smtClean="0"/>
+              <a:rPr lang="en-US"/>
               <a:t>Third level</a:t>
             </a:r>
           </a:p>
           <a:p>
             <a:pPr lvl="3"/>
             <a:r>
-              <a:rPr lang="en-US" smtClean="0"/>
+              <a:rPr lang="en-US"/>
               <a:t>Fourth level</a:t>
             </a:r>
           </a:p>
           <a:p>
             <a:pPr lvl="4"/>
             <a:r>
-              <a:rPr lang="en-US" smtClean="0"/>
+              <a:rPr lang="en-US"/>
               <a:t>Fifth level</a:t>
             </a:r>
-            <a:endParaRPr lang="en-US"/>
           </a:p>
         </p:txBody>
       </p:sp>
@@ -2274,10 +2262,9 @@
           </a:lstStyle>
           <a:p>
             <a:r>
-              <a:rPr lang="en-US" smtClean="0"/>
+              <a:rPr lang="en-US"/>
               <a:t>Click to edit Master title style</a:t>
             </a:r>
-            <a:endParaRPr lang="en-US"/>
           </a:p>
         </p:txBody>
       </p:sp>
@@ -2340,7 +2327,7 @@
           <a:p>
             <a:pPr lvl="0"/>
             <a:r>
-              <a:rPr lang="en-US" smtClean="0"/>
+              <a:rPr lang="en-US"/>
               <a:t>Click to edit Master text styles</a:t>
             </a:r>
           </a:p>
@@ -2396,38 +2383,37 @@
           <a:p>
             <a:pPr lvl="0"/>
             <a:r>
-              <a:rPr lang="en-US" smtClean="0"/>
+              <a:rPr lang="en-US"/>
               <a:t>Click to edit Master text styles</a:t>
             </a:r>
           </a:p>
           <a:p>
             <a:pPr lvl="1"/>
             <a:r>
-              <a:rPr lang="en-US" smtClean="0"/>
+              <a:rPr lang="en-US"/>
               <a:t>Second level</a:t>
             </a:r>
           </a:p>
           <a:p>
             <a:pPr lvl="2"/>
             <a:r>
-              <a:rPr lang="en-US" smtClean="0"/>
+              <a:rPr lang="en-US"/>
               <a:t>Third level</a:t>
             </a:r>
           </a:p>
           <a:p>
             <a:pPr lvl="3"/>
             <a:r>
-              <a:rPr lang="en-US" smtClean="0"/>
+              <a:rPr lang="en-US"/>
               <a:t>Fourth level</a:t>
             </a:r>
           </a:p>
           <a:p>
             <a:pPr lvl="4"/>
             <a:r>
-              <a:rPr lang="en-US" smtClean="0"/>
+              <a:rPr lang="en-US"/>
               <a:t>Fifth level</a:t>
             </a:r>
-            <a:endParaRPr lang="en-US"/>
           </a:p>
         </p:txBody>
       </p:sp>
@@ -2490,7 +2476,7 @@
           <a:p>
             <a:pPr lvl="0"/>
             <a:r>
-              <a:rPr lang="en-US" smtClean="0"/>
+              <a:rPr lang="en-US"/>
               <a:t>Click to edit Master text styles</a:t>
             </a:r>
           </a:p>
@@ -2546,38 +2532,37 @@
           <a:p>
             <a:pPr lvl="0"/>
             <a:r>
-              <a:rPr lang="en-US" smtClean="0"/>
+              <a:rPr lang="en-US"/>
               <a:t>Click to edit Master text styles</a:t>
             </a:r>
           </a:p>
           <a:p>
             <a:pPr lvl="1"/>
             <a:r>
-              <a:rPr lang="en-US" smtClean="0"/>
+              <a:rPr lang="en-US"/>
               <a:t>Second level</a:t>
             </a:r>
           </a:p>
           <a:p>
             <a:pPr lvl="2"/>
             <a:r>
-              <a:rPr lang="en-US" smtClean="0"/>
+              <a:rPr lang="en-US"/>
               <a:t>Third level</a:t>
             </a:r>
           </a:p>
           <a:p>
             <a:pPr lvl="3"/>
             <a:r>
-              <a:rPr lang="en-US" smtClean="0"/>
+              <a:rPr lang="en-US"/>
               <a:t>Fourth level</a:t>
             </a:r>
           </a:p>
           <a:p>
             <a:pPr lvl="4"/>
             <a:r>
-              <a:rPr lang="en-US" smtClean="0"/>
+              <a:rPr lang="en-US"/>
               <a:t>Fifth level</a:t>
             </a:r>
-            <a:endParaRPr lang="en-US"/>
           </a:p>
         </p:txBody>
       </p:sp>
@@ -2713,10 +2698,9 @@
           <a:lstStyle/>
           <a:p>
             <a:r>
-              <a:rPr lang="en-US" smtClean="0"/>
+              <a:rPr lang="en-US"/>
               <a:t>Click to edit Master title style</a:t>
             </a:r>
-            <a:endParaRPr lang="en-US"/>
           </a:p>
         </p:txBody>
       </p:sp>
@@ -2977,10 +2961,9 @@
           </a:lstStyle>
           <a:p>
             <a:r>
-              <a:rPr lang="en-US" smtClean="0"/>
+              <a:rPr lang="en-US"/>
               <a:t>Click to edit Master title style</a:t>
             </a:r>
-            <a:endParaRPr lang="en-US"/>
           </a:p>
         </p:txBody>
       </p:sp>
@@ -3034,38 +3017,37 @@
           <a:p>
             <a:pPr lvl="0"/>
             <a:r>
-              <a:rPr lang="en-US" smtClean="0"/>
+              <a:rPr lang="en-US"/>
               <a:t>Click to edit Master text styles</a:t>
             </a:r>
           </a:p>
           <a:p>
             <a:pPr lvl="1"/>
             <a:r>
-              <a:rPr lang="en-US" smtClean="0"/>
+              <a:rPr lang="en-US"/>
               <a:t>Second level</a:t>
             </a:r>
           </a:p>
           <a:p>
             <a:pPr lvl="2"/>
             <a:r>
-              <a:rPr lang="en-US" smtClean="0"/>
+              <a:rPr lang="en-US"/>
               <a:t>Third level</a:t>
             </a:r>
           </a:p>
           <a:p>
             <a:pPr lvl="3"/>
             <a:r>
-              <a:rPr lang="en-US" smtClean="0"/>
+              <a:rPr lang="en-US"/>
               <a:t>Fourth level</a:t>
             </a:r>
           </a:p>
           <a:p>
             <a:pPr lvl="4"/>
             <a:r>
-              <a:rPr lang="en-US" smtClean="0"/>
+              <a:rPr lang="en-US"/>
               <a:t>Fifth level</a:t>
             </a:r>
-            <a:endParaRPr lang="en-US"/>
           </a:p>
         </p:txBody>
       </p:sp>
@@ -3128,7 +3110,7 @@
           <a:p>
             <a:pPr lvl="0"/>
             <a:r>
-              <a:rPr lang="en-US" smtClean="0"/>
+              <a:rPr lang="en-US"/>
               <a:t>Click to edit Master text styles</a:t>
             </a:r>
           </a:p>
@@ -3271,10 +3253,9 @@
           <a:lstStyle/>
           <a:p>
             <a:r>
-              <a:rPr lang="en-US" smtClean="0"/>
+              <a:rPr lang="en-US"/>
               <a:t>Click to edit Master title style</a:t>
             </a:r>
-            <a:endParaRPr lang="en-US"/>
           </a:p>
         </p:txBody>
       </p:sp>
@@ -3295,38 +3276,37 @@
           <a:p>
             <a:pPr lvl="0"/>
             <a:r>
-              <a:rPr lang="en-US" smtClean="0"/>
+              <a:rPr lang="en-US"/>
               <a:t>Click to edit Master text styles</a:t>
             </a:r>
           </a:p>
           <a:p>
             <a:pPr lvl="1"/>
             <a:r>
-              <a:rPr lang="en-US" smtClean="0"/>
+              <a:rPr lang="en-US"/>
               <a:t>Second level</a:t>
             </a:r>
           </a:p>
           <a:p>
             <a:pPr lvl="2"/>
             <a:r>
-              <a:rPr lang="en-US" smtClean="0"/>
+              <a:rPr lang="en-US"/>
               <a:t>Third level</a:t>
             </a:r>
           </a:p>
           <a:p>
             <a:pPr lvl="3"/>
             <a:r>
-              <a:rPr lang="en-US" smtClean="0"/>
+              <a:rPr lang="en-US"/>
               <a:t>Fourth level</a:t>
             </a:r>
           </a:p>
           <a:p>
             <a:pPr lvl="4"/>
             <a:r>
-              <a:rPr lang="en-US" smtClean="0"/>
+              <a:rPr lang="en-US"/>
               <a:t>Fifth level</a:t>
             </a:r>
-            <a:endParaRPr lang="en-US"/>
           </a:p>
         </p:txBody>
       </p:sp>
@@ -3383,10 +3363,9 @@
           </a:lstStyle>
           <a:p>
             <a:r>
-              <a:rPr lang="en-US" smtClean="0"/>
+              <a:rPr lang="en-US"/>
               <a:t>Click to edit Master title style</a:t>
             </a:r>
-            <a:endParaRPr lang="en-US"/>
           </a:p>
         </p:txBody>
       </p:sp>
@@ -3448,7 +3427,7 @@
           </a:lstStyle>
           <a:p>
             <a:pPr lvl="0"/>
-            <a:endParaRPr lang="en-US" noProof="0" smtClean="0"/>
+            <a:endParaRPr lang="en-US" noProof="0"/>
           </a:p>
         </p:txBody>
       </p:sp>
@@ -3511,7 +3490,7 @@
           <a:p>
             <a:pPr lvl="0"/>
             <a:r>
-              <a:rPr lang="en-US" smtClean="0"/>
+              <a:rPr lang="en-US"/>
               <a:t>Click to edit Master text styles</a:t>
             </a:r>
           </a:p>
@@ -3649,10 +3628,9 @@
           <a:lstStyle/>
           <a:p>
             <a:r>
-              <a:rPr lang="en-US" smtClean="0"/>
+              <a:rPr lang="en-US"/>
               <a:t>Click to edit Master title style</a:t>
             </a:r>
-            <a:endParaRPr lang="en-US"/>
           </a:p>
         </p:txBody>
       </p:sp>
@@ -3673,38 +3651,37 @@
           <a:p>
             <a:pPr lvl="0"/>
             <a:r>
-              <a:rPr lang="en-US" smtClean="0"/>
+              <a:rPr lang="en-US"/>
               <a:t>Click to edit Master text styles</a:t>
             </a:r>
           </a:p>
           <a:p>
             <a:pPr lvl="1"/>
             <a:r>
-              <a:rPr lang="en-US" smtClean="0"/>
+              <a:rPr lang="en-US"/>
               <a:t>Second level</a:t>
             </a:r>
           </a:p>
           <a:p>
             <a:pPr lvl="2"/>
             <a:r>
-              <a:rPr lang="en-US" smtClean="0"/>
+              <a:rPr lang="en-US"/>
               <a:t>Third level</a:t>
             </a:r>
           </a:p>
           <a:p>
             <a:pPr lvl="3"/>
             <a:r>
-              <a:rPr lang="en-US" smtClean="0"/>
+              <a:rPr lang="en-US"/>
               <a:t>Fourth level</a:t>
             </a:r>
           </a:p>
           <a:p>
             <a:pPr lvl="4"/>
             <a:r>
-              <a:rPr lang="en-US" smtClean="0"/>
+              <a:rPr lang="en-US"/>
               <a:t>Fifth level</a:t>
             </a:r>
-            <a:endParaRPr lang="en-US"/>
           </a:p>
         </p:txBody>
       </p:sp>
@@ -3845,10 +3822,9 @@
           <a:lstStyle/>
           <a:p>
             <a:r>
-              <a:rPr lang="en-US" smtClean="0"/>
+              <a:rPr lang="en-US"/>
               <a:t>Click to edit Master title style</a:t>
             </a:r>
-            <a:endParaRPr lang="en-US"/>
           </a:p>
         </p:txBody>
       </p:sp>
@@ -3874,38 +3850,37 @@
           <a:p>
             <a:pPr lvl="0"/>
             <a:r>
-              <a:rPr lang="en-US" smtClean="0"/>
+              <a:rPr lang="en-US"/>
               <a:t>Click to edit Master text styles</a:t>
             </a:r>
           </a:p>
           <a:p>
             <a:pPr lvl="1"/>
             <a:r>
-              <a:rPr lang="en-US" smtClean="0"/>
+              <a:rPr lang="en-US"/>
               <a:t>Second level</a:t>
             </a:r>
           </a:p>
           <a:p>
             <a:pPr lvl="2"/>
             <a:r>
-              <a:rPr lang="en-US" smtClean="0"/>
+              <a:rPr lang="en-US"/>
               <a:t>Third level</a:t>
             </a:r>
           </a:p>
           <a:p>
             <a:pPr lvl="3"/>
             <a:r>
-              <a:rPr lang="en-US" smtClean="0"/>
+              <a:rPr lang="en-US"/>
               <a:t>Fourth level</a:t>
             </a:r>
           </a:p>
           <a:p>
             <a:pPr lvl="4"/>
             <a:r>
-              <a:rPr lang="en-US" smtClean="0"/>
+              <a:rPr lang="en-US"/>
               <a:t>Fifth level</a:t>
             </a:r>
-            <a:endParaRPr lang="en-US"/>
           </a:p>
         </p:txBody>
       </p:sp>
@@ -4050,10 +4025,9 @@
           </a:lstStyle>
           <a:p>
             <a:r>
-              <a:rPr lang="en-US" smtClean="0"/>
+              <a:rPr lang="en-US"/>
               <a:t>Click to edit Master title style</a:t>
             </a:r>
-            <a:endParaRPr lang="en-US"/>
           </a:p>
         </p:txBody>
       </p:sp>
@@ -4116,7 +4090,7 @@
           <a:p>
             <a:pPr lvl="0"/>
             <a:r>
-              <a:rPr lang="en-US" smtClean="0"/>
+              <a:rPr lang="en-US"/>
               <a:t>Click to edit Master text styles</a:t>
             </a:r>
           </a:p>
@@ -4171,10 +4145,9 @@
           <a:lstStyle/>
           <a:p>
             <a:r>
-              <a:rPr lang="en-US" smtClean="0"/>
+              <a:rPr lang="en-US"/>
               <a:t>Click to edit Master title style</a:t>
             </a:r>
-            <a:endParaRPr lang="en-US"/>
           </a:p>
         </p:txBody>
       </p:sp>
@@ -4228,38 +4201,37 @@
           <a:p>
             <a:pPr lvl="0"/>
             <a:r>
-              <a:rPr lang="en-US" smtClean="0"/>
+              <a:rPr lang="en-US"/>
               <a:t>Click to edit Master text styles</a:t>
             </a:r>
           </a:p>
           <a:p>
             <a:pPr lvl="1"/>
             <a:r>
-              <a:rPr lang="en-US" smtClean="0"/>
+              <a:rPr lang="en-US"/>
               <a:t>Second level</a:t>
             </a:r>
           </a:p>
           <a:p>
             <a:pPr lvl="2"/>
             <a:r>
-              <a:rPr lang="en-US" smtClean="0"/>
+              <a:rPr lang="en-US"/>
               <a:t>Third level</a:t>
             </a:r>
           </a:p>
           <a:p>
             <a:pPr lvl="3"/>
             <a:r>
-              <a:rPr lang="en-US" smtClean="0"/>
+              <a:rPr lang="en-US"/>
               <a:t>Fourth level</a:t>
             </a:r>
           </a:p>
           <a:p>
             <a:pPr lvl="4"/>
             <a:r>
-              <a:rPr lang="en-US" smtClean="0"/>
+              <a:rPr lang="en-US"/>
               <a:t>Fifth level</a:t>
             </a:r>
-            <a:endParaRPr lang="en-US"/>
           </a:p>
         </p:txBody>
       </p:sp>
@@ -4313,38 +4285,37 @@
           <a:p>
             <a:pPr lvl="0"/>
             <a:r>
-              <a:rPr lang="en-US" smtClean="0"/>
+              <a:rPr lang="en-US"/>
               <a:t>Click to edit Master text styles</a:t>
             </a:r>
           </a:p>
           <a:p>
             <a:pPr lvl="1"/>
             <a:r>
-              <a:rPr lang="en-US" smtClean="0"/>
+              <a:rPr lang="en-US"/>
               <a:t>Second level</a:t>
             </a:r>
           </a:p>
           <a:p>
             <a:pPr lvl="2"/>
             <a:r>
-              <a:rPr lang="en-US" smtClean="0"/>
+              <a:rPr lang="en-US"/>
               <a:t>Third level</a:t>
             </a:r>
           </a:p>
           <a:p>
             <a:pPr lvl="3"/>
             <a:r>
-              <a:rPr lang="en-US" smtClean="0"/>
+              <a:rPr lang="en-US"/>
               <a:t>Fourth level</a:t>
             </a:r>
           </a:p>
           <a:p>
             <a:pPr lvl="4"/>
             <a:r>
-              <a:rPr lang="en-US" smtClean="0"/>
+              <a:rPr lang="en-US"/>
               <a:t>Fifth level</a:t>
             </a:r>
-            <a:endParaRPr lang="en-US"/>
           </a:p>
         </p:txBody>
       </p:sp>
@@ -4401,10 +4372,9 @@
           </a:lstStyle>
           <a:p>
             <a:r>
-              <a:rPr lang="en-US" smtClean="0"/>
+              <a:rPr lang="en-US"/>
               <a:t>Click to edit Master title style</a:t>
             </a:r>
-            <a:endParaRPr lang="en-US"/>
           </a:p>
         </p:txBody>
       </p:sp>
@@ -4467,7 +4437,7 @@
           <a:p>
             <a:pPr lvl="0"/>
             <a:r>
-              <a:rPr lang="en-US" smtClean="0"/>
+              <a:rPr lang="en-US"/>
               <a:t>Click to edit Master text styles</a:t>
             </a:r>
           </a:p>
@@ -4523,38 +4493,37 @@
           <a:p>
             <a:pPr lvl="0"/>
             <a:r>
-              <a:rPr lang="en-US" smtClean="0"/>
+              <a:rPr lang="en-US"/>
               <a:t>Click to edit Master text styles</a:t>
             </a:r>
           </a:p>
           <a:p>
             <a:pPr lvl="1"/>
             <a:r>
-              <a:rPr lang="en-US" smtClean="0"/>
+              <a:rPr lang="en-US"/>
               <a:t>Second level</a:t>
             </a:r>
           </a:p>
           <a:p>
             <a:pPr lvl="2"/>
             <a:r>
-              <a:rPr lang="en-US" smtClean="0"/>
+              <a:rPr lang="en-US"/>
               <a:t>Third level</a:t>
             </a:r>
           </a:p>
           <a:p>
             <a:pPr lvl="3"/>
             <a:r>
-              <a:rPr lang="en-US" smtClean="0"/>
+              <a:rPr lang="en-US"/>
               <a:t>Fourth level</a:t>
             </a:r>
           </a:p>
           <a:p>
             <a:pPr lvl="4"/>
             <a:r>
-              <a:rPr lang="en-US" smtClean="0"/>
+              <a:rPr lang="en-US"/>
               <a:t>Fifth level</a:t>
             </a:r>
-            <a:endParaRPr lang="en-US"/>
           </a:p>
         </p:txBody>
       </p:sp>
@@ -4617,7 +4586,7 @@
           <a:p>
             <a:pPr lvl="0"/>
             <a:r>
-              <a:rPr lang="en-US" smtClean="0"/>
+              <a:rPr lang="en-US"/>
               <a:t>Click to edit Master text styles</a:t>
             </a:r>
           </a:p>
@@ -4673,38 +4642,37 @@
           <a:p>
             <a:pPr lvl="0"/>
             <a:r>
-              <a:rPr lang="en-US" smtClean="0"/>
+              <a:rPr lang="en-US"/>
               <a:t>Click to edit Master text styles</a:t>
             </a:r>
           </a:p>
           <a:p>
             <a:pPr lvl="1"/>
             <a:r>
-              <a:rPr lang="en-US" smtClean="0"/>
+              <a:rPr lang="en-US"/>
               <a:t>Second level</a:t>
             </a:r>
           </a:p>
           <a:p>
             <a:pPr lvl="2"/>
             <a:r>
-              <a:rPr lang="en-US" smtClean="0"/>
+              <a:rPr lang="en-US"/>
               <a:t>Third level</a:t>
             </a:r>
           </a:p>
           <a:p>
             <a:pPr lvl="3"/>
             <a:r>
-              <a:rPr lang="en-US" smtClean="0"/>
+              <a:rPr lang="en-US"/>
               <a:t>Fourth level</a:t>
             </a:r>
           </a:p>
           <a:p>
             <a:pPr lvl="4"/>
             <a:r>
-              <a:rPr lang="en-US" smtClean="0"/>
+              <a:rPr lang="en-US"/>
               <a:t>Fifth level</a:t>
             </a:r>
-            <a:endParaRPr lang="en-US"/>
           </a:p>
         </p:txBody>
       </p:sp>
@@ -4757,10 +4725,9 @@
           <a:lstStyle/>
           <a:p>
             <a:r>
-              <a:rPr lang="en-US" smtClean="0"/>
+              <a:rPr lang="en-US"/>
               <a:t>Click to edit Master title style</a:t>
             </a:r>
-            <a:endParaRPr lang="en-US"/>
           </a:p>
         </p:txBody>
       </p:sp>
@@ -4845,10 +4812,9 @@
           </a:lstStyle>
           <a:p>
             <a:r>
-              <a:rPr lang="en-US" smtClean="0"/>
+              <a:rPr lang="en-US"/>
               <a:t>Click to edit Master title style</a:t>
             </a:r>
-            <a:endParaRPr lang="en-US"/>
           </a:p>
         </p:txBody>
       </p:sp>
@@ -4902,38 +4868,37 @@
           <a:p>
             <a:pPr lvl="0"/>
             <a:r>
-              <a:rPr lang="en-US" smtClean="0"/>
+              <a:rPr lang="en-US"/>
               <a:t>Click to edit Master text styles</a:t>
             </a:r>
           </a:p>
           <a:p>
             <a:pPr lvl="1"/>
             <a:r>
-              <a:rPr lang="en-US" smtClean="0"/>
+              <a:rPr lang="en-US"/>
               <a:t>Second level</a:t>
             </a:r>
           </a:p>
           <a:p>
             <a:pPr lvl="2"/>
             <a:r>
-              <a:rPr lang="en-US" smtClean="0"/>
+              <a:rPr lang="en-US"/>
               <a:t>Third level</a:t>
             </a:r>
           </a:p>
           <a:p>
             <a:pPr lvl="3"/>
             <a:r>
-              <a:rPr lang="en-US" smtClean="0"/>
+              <a:rPr lang="en-US"/>
               <a:t>Fourth level</a:t>
             </a:r>
           </a:p>
           <a:p>
             <a:pPr lvl="4"/>
             <a:r>
-              <a:rPr lang="en-US" smtClean="0"/>
+              <a:rPr lang="en-US"/>
               <a:t>Fifth level</a:t>
             </a:r>
-            <a:endParaRPr lang="en-US"/>
           </a:p>
         </p:txBody>
       </p:sp>
@@ -4996,7 +4961,7 @@
           <a:p>
             <a:pPr lvl="0"/>
             <a:r>
-              <a:rPr lang="en-US" smtClean="0"/>
+              <a:rPr lang="en-US"/>
               <a:t>Click to edit Master text styles</a:t>
             </a:r>
           </a:p>
@@ -5055,10 +5020,9 @@
           </a:lstStyle>
           <a:p>
             <a:r>
-              <a:rPr lang="en-US" smtClean="0"/>
+              <a:rPr lang="en-US"/>
               <a:t>Click to edit Master title style</a:t>
             </a:r>
-            <a:endParaRPr lang="en-US"/>
           </a:p>
         </p:txBody>
       </p:sp>
@@ -5121,7 +5085,7 @@
           <a:p>
             <a:pPr lvl="0"/>
             <a:r>
-              <a:rPr lang="en-US" noProof="0" smtClean="0"/>
+              <a:rPr lang="en-US" noProof="0"/>
               <a:t>Click icon to add picture</a:t>
             </a:r>
           </a:p>
@@ -5186,7 +5150,7 @@
           <a:p>
             <a:pPr lvl="0"/>
             <a:r>
-              <a:rPr lang="en-US" smtClean="0"/>
+              <a:rPr lang="en-US"/>
               <a:t>Click to edit Master text styles</a:t>
             </a:r>
           </a:p>
@@ -5270,7 +5234,7 @@
           <a:p>
             <a:pPr lvl="0"/>
             <a:r>
-              <a:rPr lang="en-US" smtClean="0"/>
+              <a:rPr lang="en-US"/>
               <a:t>Click to edit Title Slide</a:t>
             </a:r>
           </a:p>
@@ -5314,35 +5278,35 @@
           <a:p>
             <a:pPr lvl="0"/>
             <a:r>
-              <a:rPr lang="en-US" smtClean="0"/>
+              <a:rPr lang="en-US"/>
               <a:t>Click to edit Master text styles</a:t>
             </a:r>
           </a:p>
           <a:p>
             <a:pPr lvl="1"/>
             <a:r>
-              <a:rPr lang="en-US" smtClean="0"/>
+              <a:rPr lang="en-US"/>
               <a:t>Second level</a:t>
             </a:r>
           </a:p>
           <a:p>
             <a:pPr lvl="2"/>
             <a:r>
-              <a:rPr lang="en-US" smtClean="0"/>
+              <a:rPr lang="en-US"/>
               <a:t>Third level</a:t>
             </a:r>
           </a:p>
           <a:p>
             <a:pPr lvl="3"/>
             <a:r>
-              <a:rPr lang="en-US" smtClean="0"/>
+              <a:rPr lang="en-US"/>
               <a:t>Fourth level</a:t>
             </a:r>
           </a:p>
           <a:p>
             <a:pPr lvl="4"/>
             <a:r>
-              <a:rPr lang="en-US" smtClean="0"/>
+              <a:rPr lang="en-US"/>
               <a:t>Fifth level</a:t>
             </a:r>
           </a:p>
@@ -5367,13 +5331,6 @@
   <p:transition>
     <p:fade/>
   </p:transition>
-  <p:timing>
-    <p:tnLst>
-      <p:par>
-        <p:cTn id="1" dur="indefinite" restart="never" nodeType="tmRoot"/>
-      </p:par>
-    </p:tnLst>
-  </p:timing>
   <p:hf hdr="0" ftr="0" dt="0"/>
   <p:txStyles>
     <p:titleStyle>
@@ -6011,7 +5968,7 @@
           <a:p>
             <a:pPr lvl="0"/>
             <a:r>
-              <a:rPr lang="en-US" smtClean="0"/>
+              <a:rPr lang="en-US"/>
               <a:t>Click to edit Master title style</a:t>
             </a:r>
           </a:p>
@@ -6053,35 +6010,35 @@
           <a:p>
             <a:pPr lvl="0"/>
             <a:r>
-              <a:rPr lang="en-US" smtClean="0"/>
+              <a:rPr lang="en-US"/>
               <a:t>Click to edit Master text styles</a:t>
             </a:r>
           </a:p>
           <a:p>
             <a:pPr lvl="1"/>
             <a:r>
-              <a:rPr lang="en-US" smtClean="0"/>
+              <a:rPr lang="en-US"/>
               <a:t>Second level</a:t>
             </a:r>
           </a:p>
           <a:p>
             <a:pPr lvl="2"/>
             <a:r>
-              <a:rPr lang="en-US" smtClean="0"/>
+              <a:rPr lang="en-US"/>
               <a:t>Third level</a:t>
             </a:r>
           </a:p>
           <a:p>
             <a:pPr lvl="3"/>
             <a:r>
-              <a:rPr lang="en-US" smtClean="0"/>
+              <a:rPr lang="en-US"/>
               <a:t>Fourth level</a:t>
             </a:r>
           </a:p>
           <a:p>
             <a:pPr lvl="4"/>
             <a:r>
-              <a:rPr lang="en-US" smtClean="0"/>
+              <a:rPr lang="en-US"/>
               <a:t>Fifth level</a:t>
             </a:r>
           </a:p>
@@ -6683,10 +6640,10 @@
               <a:defRPr/>
             </a:pPr>
             <a:r>
-              <a:rPr lang="en-US" sz="4600" b="1" dirty="0" smtClean="0"/>
+              <a:rPr lang="en-US" sz="4600" b="1" dirty="0"/>
               <a:t>Implementing Web Security in Your ASP.NET Applications</a:t>
             </a:r>
-            <a:endParaRPr lang="en-US" sz="4600" b="1" dirty="0" smtClean="0">
+            <a:endParaRPr lang="en-US" sz="4600" b="1" dirty="0">
               <a:solidFill>
                 <a:schemeClr val="tx2"/>
               </a:solidFill>
@@ -6719,7 +6676,7 @@
               <a:defRPr/>
             </a:pPr>
             <a:r>
-              <a:rPr lang="en-US" sz="2400" b="1" dirty="0" smtClean="0">
+              <a:rPr lang="en-US" sz="2400" b="1" dirty="0">
                 <a:solidFill>
                   <a:schemeClr val="tx2"/>
                 </a:solidFill>
@@ -6733,7 +6690,7 @@
               <a:defRPr/>
             </a:pPr>
             <a:r>
-              <a:rPr lang="en-US" sz="2400" b="1" dirty="0" smtClean="0">
+              <a:rPr lang="en-US" sz="2400" b="1" dirty="0">
                 <a:solidFill>
                   <a:schemeClr val="tx2"/>
                 </a:solidFill>
@@ -6747,7 +6704,7 @@
               <a:defRPr/>
             </a:pPr>
             <a:r>
-              <a:rPr lang="en-US" sz="2400" b="1" dirty="0" smtClean="0">
+              <a:rPr lang="en-US" sz="2400" b="1" dirty="0">
                 <a:solidFill>
                   <a:schemeClr val="tx2"/>
                 </a:solidFill>
@@ -6755,14 +6712,14 @@
               <a:t>@</a:t>
             </a:r>
             <a:r>
-              <a:rPr lang="en-US" sz="2400" b="1" dirty="0" err="1" smtClean="0">
+              <a:rPr lang="en-US" sz="2400" b="1" dirty="0" err="1">
                 <a:solidFill>
                   <a:schemeClr val="tx2"/>
                 </a:solidFill>
               </a:rPr>
               <a:t>jglozano</a:t>
             </a:r>
-            <a:endParaRPr lang="en-US" sz="2400" b="1" dirty="0" smtClean="0">
+            <a:endParaRPr lang="en-US" sz="2400" b="1" dirty="0">
               <a:solidFill>
                 <a:schemeClr val="tx2"/>
               </a:solidFill>
@@ -6773,7 +6730,7 @@
               <a:buNone/>
               <a:defRPr/>
             </a:pPr>
-            <a:endParaRPr lang="en-US" sz="2400" b="1" dirty="0" smtClean="0">
+            <a:endParaRPr lang="en-US" sz="2400" b="1" dirty="0">
               <a:solidFill>
                 <a:schemeClr val="tx2"/>
               </a:solidFill>
@@ -6789,13 +6746,6 @@
   <p:transition>
     <p:fade/>
   </p:transition>
-  <p:timing>
-    <p:tnLst>
-      <p:par>
-        <p:cTn id="1" dur="indefinite" restart="never" nodeType="tmRoot"/>
-      </p:par>
-    </p:tnLst>
-  </p:timing>
 </p:sld>
 </file>
 
@@ -6832,10 +6782,9 @@
           <a:lstStyle/>
           <a:p>
             <a:r>
-              <a:rPr lang="en-US" b="1" dirty="0" smtClean="0"/>
+              <a:rPr lang="en-US" b="1" dirty="0"/>
               <a:t>Authentication Flow</a:t>
             </a:r>
-            <a:endParaRPr lang="en-US" b="1" dirty="0"/>
           </a:p>
         </p:txBody>
       </p:sp>
@@ -6873,19 +6822,15 @@
           <a:p>
             <a:pPr lvl="1"/>
             <a:r>
-              <a:rPr lang="en-US" dirty="0" smtClean="0"/>
+              <a:rPr lang="en-US" dirty="0"/>
               <a:t>Uses OAuth 2 flow</a:t>
             </a:r>
           </a:p>
           <a:p>
             <a:pPr lvl="1"/>
             <a:r>
-              <a:rPr lang="en-US" dirty="0" smtClean="0"/>
-              <a:t>Adds </a:t>
-            </a:r>
-            <a:r>
               <a:rPr lang="en-US" dirty="0"/>
-              <a:t>User Information exchange via claims</a:t>
+              <a:t>Adds User Information exchange via claims</a:t>
             </a:r>
           </a:p>
           <a:p>
@@ -6906,13 +6851,6 @@
   <p:transition>
     <p:fade/>
   </p:transition>
-  <p:timing>
-    <p:tnLst>
-      <p:par>
-        <p:cTn id="1" dur="indefinite" restart="never" nodeType="tmRoot"/>
-      </p:par>
-    </p:tnLst>
-  </p:timing>
 </p:sld>
 </file>
 
@@ -6949,10 +6887,9 @@
           <a:lstStyle/>
           <a:p>
             <a:r>
-              <a:rPr lang="en-US" b="1" dirty="0" smtClean="0"/>
+              <a:rPr lang="en-US" b="1" dirty="0"/>
               <a:t>OAuth 2 Flow</a:t>
             </a:r>
-            <a:endParaRPr lang="en-US" b="1" dirty="0"/>
           </a:p>
         </p:txBody>
       </p:sp>
@@ -6977,60 +6914,60 @@
           <a:lstStyle/>
           <a:p>
             <a:r>
-              <a:rPr lang="en-US" b="1" dirty="0" smtClean="0"/>
+              <a:rPr lang="en-US" b="1" dirty="0"/>
               <a:t>Application</a:t>
             </a:r>
             <a:r>
-              <a:rPr lang="en-US" dirty="0" smtClean="0"/>
+              <a:rPr lang="en-US" dirty="0"/>
               <a:t> redirects </a:t>
             </a:r>
             <a:r>
-              <a:rPr lang="en-US" b="1" dirty="0" smtClean="0"/>
+              <a:rPr lang="en-US" b="1" dirty="0"/>
               <a:t>User</a:t>
             </a:r>
             <a:r>
-              <a:rPr lang="en-US" dirty="0" smtClean="0"/>
+              <a:rPr lang="en-US" dirty="0"/>
               <a:t> to </a:t>
             </a:r>
             <a:r>
-              <a:rPr lang="en-US" b="1" dirty="0" smtClean="0"/>
+              <a:rPr lang="en-US" b="1" dirty="0"/>
               <a:t>Service</a:t>
             </a:r>
             <a:r>
-              <a:rPr lang="en-US" dirty="0" smtClean="0"/>
+              <a:rPr lang="en-US" dirty="0"/>
               <a:t> for </a:t>
             </a:r>
             <a:r>
-              <a:rPr lang="en-US" i="1" dirty="0" smtClean="0"/>
+              <a:rPr lang="en-US" i="1" dirty="0"/>
               <a:t>authorization</a:t>
             </a:r>
-            <a:endParaRPr lang="en-US" b="1" dirty="0" smtClean="0"/>
-          </a:p>
-          <a:p>
-            <a:r>
-              <a:rPr lang="en-US" dirty="0" smtClean="0"/>
+            <a:endParaRPr lang="en-US" b="1" dirty="0"/>
+          </a:p>
+          <a:p>
+            <a:r>
+              <a:rPr lang="en-US" dirty="0"/>
               <a:t>User </a:t>
             </a:r>
             <a:r>
-              <a:rPr lang="en-US" i="1" dirty="0" smtClean="0"/>
+              <a:rPr lang="en-US" i="1" dirty="0"/>
               <a:t>authenticates</a:t>
             </a:r>
             <a:r>
-              <a:rPr lang="en-US" dirty="0" smtClean="0"/>
+              <a:rPr lang="en-US" dirty="0"/>
               <a:t> into Service and grants Application access to </a:t>
             </a:r>
             <a:r>
-              <a:rPr lang="en-US" b="1" dirty="0" smtClean="0"/>
+              <a:rPr lang="en-US" b="1" dirty="0"/>
               <a:t>Resources</a:t>
             </a:r>
           </a:p>
           <a:p>
             <a:r>
-              <a:rPr lang="en-US" dirty="0" smtClean="0"/>
+              <a:rPr lang="en-US" dirty="0"/>
               <a:t>Service redirects User back to Application (via Redirect URL) with a special </a:t>
             </a:r>
             <a:r>
-              <a:rPr lang="en-US" b="1" dirty="0" smtClean="0"/>
+              <a:rPr lang="en-US" b="1" dirty="0"/>
               <a:t>Code</a:t>
             </a:r>
             <a:endParaRPr lang="en-US" dirty="0"/>
@@ -7050,13 +6987,6 @@
   <p:transition>
     <p:fade/>
   </p:transition>
-  <p:timing>
-    <p:tnLst>
-      <p:par>
-        <p:cTn id="1" dur="indefinite" restart="never" nodeType="tmRoot"/>
-      </p:par>
-    </p:tnLst>
-  </p:timing>
 </p:sld>
 </file>
 
@@ -7093,10 +7023,9 @@
           <a:lstStyle/>
           <a:p>
             <a:r>
-              <a:rPr lang="en-US" b="1" dirty="0" smtClean="0"/>
+              <a:rPr lang="en-US" b="1" dirty="0"/>
               <a:t>OAuth 2 Flow</a:t>
             </a:r>
-            <a:endParaRPr lang="en-US" b="1" dirty="0"/>
           </a:p>
         </p:txBody>
       </p:sp>
@@ -7121,27 +7050,26 @@
           <a:lstStyle/>
           <a:p>
             <a:r>
-              <a:rPr lang="en-US" dirty="0" smtClean="0"/>
+              <a:rPr lang="en-US" dirty="0"/>
               <a:t>Application uses Code to get an </a:t>
             </a:r>
             <a:r>
-              <a:rPr lang="en-US" b="1" dirty="0" smtClean="0"/>
+              <a:rPr lang="en-US" b="1" dirty="0"/>
               <a:t>Access Token</a:t>
             </a:r>
-            <a:endParaRPr lang="en-US" dirty="0" smtClean="0"/>
-          </a:p>
-          <a:p>
-            <a:r>
-              <a:rPr lang="en-US" dirty="0" smtClean="0"/>
+            <a:endParaRPr lang="en-US" dirty="0"/>
+          </a:p>
+          <a:p>
+            <a:r>
+              <a:rPr lang="en-US" dirty="0"/>
               <a:t>Service returns Access Token for the User</a:t>
             </a:r>
           </a:p>
           <a:p>
             <a:r>
-              <a:rPr lang="en-US" dirty="0" smtClean="0"/>
+              <a:rPr lang="en-US" dirty="0"/>
               <a:t>Application can use Access Token for subsequent requests to Service on User’s behalf</a:t>
             </a:r>
-            <a:endParaRPr lang="en-US" dirty="0"/>
           </a:p>
         </p:txBody>
       </p:sp>
@@ -7158,13 +7086,6 @@
   <p:transition>
     <p:fade/>
   </p:transition>
-  <p:timing>
-    <p:tnLst>
-      <p:par>
-        <p:cTn id="1" dur="indefinite" restart="never" nodeType="tmRoot"/>
-      </p:par>
-    </p:tnLst>
-  </p:timing>
 </p:sld>
 </file>
 
@@ -7206,10 +7127,9 @@
           <a:lstStyle/>
           <a:p>
             <a:r>
-              <a:rPr lang="en-US" b="1" dirty="0" smtClean="0"/>
+              <a:rPr lang="en-US" b="1" dirty="0"/>
               <a:t>OpenID Connect Flow</a:t>
             </a:r>
-            <a:endParaRPr lang="en-US" b="1" dirty="0"/>
           </a:p>
         </p:txBody>
       </p:sp>
@@ -7520,160 +7440,76 @@
           </a:lstStyle>
           <a:p>
             <a:r>
-              <a:rPr lang="en-US" b="1" dirty="0" smtClean="0">
-                <a:effectLst/>
-              </a:rPr>
-              <a:t>Relying </a:t>
-            </a:r>
-            <a:r>
               <a:rPr lang="en-US" b="1" dirty="0">
                 <a:effectLst/>
               </a:rPr>
-              <a:t>P</a:t>
-            </a:r>
-            <a:r>
-              <a:rPr lang="en-US" b="1" dirty="0" smtClean="0">
-                <a:effectLst/>
-              </a:rPr>
-              <a:t>arty</a:t>
-            </a:r>
-            <a:r>
-              <a:rPr lang="en-US" dirty="0" smtClean="0">
-                <a:effectLst/>
-              </a:rPr>
-              <a:t> </a:t>
+              <a:t>Relying Party</a:t>
             </a:r>
             <a:r>
               <a:rPr lang="en-US" dirty="0">
                 <a:effectLst/>
               </a:rPr>
-              <a:t>sends </a:t>
-            </a:r>
-            <a:r>
-              <a:rPr lang="en-US" dirty="0" smtClean="0">
+              <a:t> sends request to the </a:t>
+            </a:r>
+            <a:r>
+              <a:rPr lang="en-US" b="1" dirty="0">
                 <a:effectLst/>
               </a:rPr>
-              <a:t>request </a:t>
+              <a:t>OpenID Provider</a:t>
             </a:r>
             <a:r>
               <a:rPr lang="en-US" dirty="0">
                 <a:effectLst/>
               </a:rPr>
-              <a:t>to the </a:t>
+              <a:t> to authenticate the end user</a:t>
+            </a:r>
+          </a:p>
+          <a:p>
+            <a:r>
+              <a:rPr lang="en-US" dirty="0">
+                <a:effectLst/>
+              </a:rPr>
+              <a:t>OpenID provider authenticates the user</a:t>
+            </a:r>
+          </a:p>
+          <a:p>
+            <a:r>
+              <a:rPr lang="en-US" dirty="0">
+                <a:effectLst/>
+              </a:rPr>
+              <a:t>OpenID provider sends the </a:t>
             </a:r>
             <a:r>
               <a:rPr lang="en-US" b="1" dirty="0">
                 <a:effectLst/>
               </a:rPr>
-              <a:t>OpenID </a:t>
-            </a:r>
-            <a:r>
-              <a:rPr lang="en-US" b="1" dirty="0" smtClean="0">
-                <a:effectLst/>
-              </a:rPr>
-              <a:t>Provider</a:t>
-            </a:r>
-            <a:r>
-              <a:rPr lang="en-US" dirty="0" smtClean="0">
-                <a:effectLst/>
-              </a:rPr>
-              <a:t> </a:t>
+              <a:t>ID Token</a:t>
             </a:r>
             <a:r>
               <a:rPr lang="en-US" dirty="0">
                 <a:effectLst/>
               </a:rPr>
-              <a:t>to authenticate the end user</a:t>
-            </a:r>
-          </a:p>
-          <a:p>
-            <a:r>
-              <a:rPr lang="en-US" dirty="0" smtClean="0">
+              <a:t> and </a:t>
+            </a:r>
+            <a:r>
+              <a:rPr lang="en-US" b="1" dirty="0">
                 <a:effectLst/>
               </a:rPr>
-              <a:t>OpenID </a:t>
+              <a:t>Access Token</a:t>
             </a:r>
             <a:r>
               <a:rPr lang="en-US" dirty="0">
                 <a:effectLst/>
               </a:rPr>
-              <a:t>provider authenticates the user</a:t>
-            </a:r>
-          </a:p>
-          <a:p>
-            <a:r>
-              <a:rPr lang="en-US" dirty="0" smtClean="0">
-                <a:effectLst/>
-              </a:rPr>
-              <a:t>OpenID </a:t>
-            </a:r>
-            <a:r>
-              <a:rPr lang="en-US" dirty="0">
-                <a:effectLst/>
-              </a:rPr>
-              <a:t>provider sends the </a:t>
-            </a:r>
-            <a:r>
-              <a:rPr lang="en-US" b="1" dirty="0">
-                <a:effectLst/>
-              </a:rPr>
-              <a:t>ID </a:t>
-            </a:r>
-            <a:r>
-              <a:rPr lang="en-US" b="1" dirty="0" smtClean="0">
-                <a:effectLst/>
-              </a:rPr>
-              <a:t>Token</a:t>
-            </a:r>
-            <a:r>
-              <a:rPr lang="en-US" dirty="0" smtClean="0">
-                <a:effectLst/>
-              </a:rPr>
-              <a:t> </a:t>
-            </a:r>
-            <a:r>
-              <a:rPr lang="en-US" dirty="0">
-                <a:effectLst/>
-              </a:rPr>
-              <a:t>and </a:t>
-            </a:r>
-            <a:r>
-              <a:rPr lang="en-US" b="1" dirty="0">
-                <a:effectLst/>
-              </a:rPr>
-              <a:t>A</a:t>
-            </a:r>
-            <a:r>
-              <a:rPr lang="en-US" b="1" dirty="0" smtClean="0">
-                <a:effectLst/>
-              </a:rPr>
-              <a:t>ccess Token</a:t>
-            </a:r>
-            <a:r>
-              <a:rPr lang="en-US" dirty="0" smtClean="0">
-                <a:effectLst/>
-              </a:rPr>
-              <a:t> </a:t>
-            </a:r>
-            <a:r>
-              <a:rPr lang="en-US" dirty="0">
-                <a:effectLst/>
-              </a:rPr>
-              <a:t>to the </a:t>
-            </a:r>
-            <a:r>
-              <a:rPr lang="en-US" dirty="0" smtClean="0">
-                <a:effectLst/>
-              </a:rPr>
-              <a:t>Relying Party</a:t>
-            </a:r>
-            <a:endParaRPr lang="en-US" kern="0" dirty="0" smtClean="0"/>
+              <a:t> to the Relying Party</a:t>
+            </a:r>
+            <a:endParaRPr lang="en-US" kern="0" dirty="0"/>
           </a:p>
           <a:p>
             <a:pPr marL="0" indent="0">
               <a:buNone/>
             </a:pPr>
-            <a:endParaRPr lang="en-US" kern="0" dirty="0" smtClean="0"/>
+            <a:endParaRPr lang="en-US" kern="0" dirty="0"/>
           </a:p>
         </p:txBody>
       </p:sp>
@@ -7690,13 +7526,6 @@
   <p:transition>
     <p:fade/>
   </p:transition>
-  <p:timing>
-    <p:tnLst>
-      <p:par>
-        <p:cTn id="1" dur="indefinite" restart="never" nodeType="tmRoot"/>
-      </p:par>
-    </p:tnLst>
-  </p:timing>
 </p:sld>
 </file>
 
@@ -7733,10 +7562,9 @@
           <a:lstStyle/>
           <a:p>
             <a:r>
-              <a:rPr lang="en-US" b="1" dirty="0" smtClean="0"/>
+              <a:rPr lang="en-US" b="1" dirty="0"/>
               <a:t>OpenID Connect Flow</a:t>
             </a:r>
-            <a:endParaRPr lang="en-US" b="1" dirty="0"/>
           </a:p>
         </p:txBody>
       </p:sp>
@@ -7764,106 +7592,40 @@
               <a:rPr lang="en-US" dirty="0">
                 <a:effectLst/>
               </a:rPr>
-              <a:t>R</a:t>
-            </a:r>
-            <a:r>
-              <a:rPr lang="en-US" dirty="0" smtClean="0">
+              <a:t>Relying Party sends a request to the </a:t>
+            </a:r>
+            <a:r>
+              <a:rPr lang="en-US" b="1" dirty="0">
                 <a:effectLst/>
               </a:rPr>
-              <a:t>elying </a:t>
+              <a:t>User Info</a:t>
             </a:r>
             <a:r>
               <a:rPr lang="en-US" dirty="0">
                 <a:effectLst/>
               </a:rPr>
-              <a:t>P</a:t>
-            </a:r>
-            <a:r>
-              <a:rPr lang="en-US" dirty="0" smtClean="0">
-                <a:effectLst/>
-              </a:rPr>
-              <a:t>arty </a:t>
-            </a:r>
+              <a:t> endpoint with the access token.</a:t>
+            </a:r>
+          </a:p>
+          <a:p>
             <a:r>
               <a:rPr lang="en-US" dirty="0">
                 <a:effectLst/>
               </a:rPr>
-              <a:t>sends a request to the </a:t>
-            </a:r>
-            <a:r>
-              <a:rPr lang="en-US" b="1" dirty="0" smtClean="0">
-                <a:effectLst/>
-              </a:rPr>
-              <a:t>User </a:t>
+              <a:t>User Info endpoint returns the </a:t>
             </a:r>
             <a:r>
               <a:rPr lang="en-US" b="1" dirty="0">
                 <a:effectLst/>
               </a:rPr>
-              <a:t>I</a:t>
-            </a:r>
-            <a:r>
-              <a:rPr lang="en-US" b="1" dirty="0" smtClean="0">
-                <a:effectLst/>
-              </a:rPr>
-              <a:t>nfo</a:t>
-            </a:r>
-            <a:r>
-              <a:rPr lang="en-US" dirty="0" smtClean="0">
-                <a:effectLst/>
-              </a:rPr>
-              <a:t> </a:t>
+              <a:t>Claims</a:t>
             </a:r>
             <a:r>
               <a:rPr lang="en-US" dirty="0">
                 <a:effectLst/>
               </a:rPr>
-              <a:t>endpoint with the access </a:t>
-            </a:r>
-            <a:r>
-              <a:rPr lang="en-US" dirty="0" smtClean="0">
-                <a:effectLst/>
-              </a:rPr>
-              <a:t>token.</a:t>
-            </a:r>
-            <a:endParaRPr lang="en-US" dirty="0">
-              <a:effectLst/>
-            </a:endParaRPr>
-          </a:p>
-          <a:p>
-            <a:r>
-              <a:rPr lang="en-US" dirty="0" smtClean="0">
-                <a:effectLst/>
-              </a:rPr>
-              <a:t>User Info </a:t>
-            </a:r>
-            <a:r>
-              <a:rPr lang="en-US" dirty="0">
-                <a:effectLst/>
-              </a:rPr>
-              <a:t>endpoint returns the </a:t>
-            </a:r>
-            <a:r>
-              <a:rPr lang="en-US" b="1" dirty="0" smtClean="0">
-                <a:effectLst/>
-              </a:rPr>
-              <a:t>Claims</a:t>
-            </a:r>
-            <a:r>
-              <a:rPr lang="en-US" dirty="0">
-                <a:effectLst/>
-              </a:rPr>
-              <a:t> </a:t>
-            </a:r>
-            <a:r>
-              <a:rPr lang="en-US" dirty="0" smtClean="0">
-                <a:effectLst/>
-              </a:rPr>
-              <a:t>for the User.</a:t>
-            </a:r>
-            <a:endParaRPr lang="en-US" dirty="0">
-              <a:effectLst/>
-            </a:endParaRPr>
+              <a:t> for the User.</a:t>
+            </a:r>
           </a:p>
         </p:txBody>
       </p:sp>
@@ -7880,13 +7642,6 @@
   <p:transition>
     <p:fade/>
   </p:transition>
-  <p:timing>
-    <p:tnLst>
-      <p:par>
-        <p:cTn id="1" dur="indefinite" restart="never" nodeType="tmRoot"/>
-      </p:par>
-    </p:tnLst>
-  </p:timing>
 </p:sld>
 </file>
 
@@ -7928,10 +7683,9 @@
           <a:lstStyle/>
           <a:p>
             <a:r>
-              <a:rPr lang="en-US" b="1" dirty="0" smtClean="0"/>
+              <a:rPr lang="en-US" b="1" dirty="0"/>
               <a:t>Huh?</a:t>
             </a:r>
-            <a:endParaRPr lang="en-US" b="1" dirty="0"/>
           </a:p>
         </p:txBody>
       </p:sp>
@@ -7959,10 +7713,10 @@
               <a:buNone/>
             </a:pPr>
             <a:r>
-              <a:rPr lang="en-US" sz="4800" b="1" dirty="0" smtClean="0"/>
+              <a:rPr lang="en-US" sz="4800" b="1" dirty="0"/>
               <a:t>Huh?</a:t>
             </a:r>
-            <a:endParaRPr lang="en-US" sz="2800" b="1" dirty="0" smtClean="0"/>
+            <a:endParaRPr lang="en-US" sz="2800" b="1" dirty="0"/>
           </a:p>
         </p:txBody>
       </p:sp>
@@ -7979,13 +7733,6 @@
   <p:transition>
     <p:fade/>
   </p:transition>
-  <p:timing>
-    <p:tnLst>
-      <p:par>
-        <p:cTn id="1" dur="indefinite" restart="never" nodeType="tmRoot"/>
-      </p:par>
-    </p:tnLst>
-  </p:timing>
 </p:sld>
 </file>
 
@@ -8027,10 +7774,9 @@
           <a:lstStyle/>
           <a:p>
             <a:r>
-              <a:rPr lang="en-US" b="1" dirty="0" smtClean="0"/>
+              <a:rPr lang="en-US" b="1" dirty="0"/>
               <a:t>Demo</a:t>
             </a:r>
-            <a:endParaRPr lang="en-US" b="1" dirty="0"/>
           </a:p>
         </p:txBody>
       </p:sp>
@@ -8058,10 +7804,10 @@
               <a:buNone/>
             </a:pPr>
             <a:r>
-              <a:rPr lang="en-US" sz="4800" b="1" dirty="0" smtClean="0"/>
+              <a:rPr lang="en-US" sz="4800" b="1" dirty="0"/>
               <a:t>Enough slides, let’s code.</a:t>
             </a:r>
-            <a:endParaRPr lang="en-US" sz="2800" b="1" dirty="0" smtClean="0"/>
+            <a:endParaRPr lang="en-US" sz="2800" b="1" dirty="0"/>
           </a:p>
         </p:txBody>
       </p:sp>
@@ -8078,13 +7824,6 @@
   <p:transition>
     <p:fade/>
   </p:transition>
-  <p:timing>
-    <p:tnLst>
-      <p:par>
-        <p:cTn id="1" dur="indefinite" restart="never" nodeType="tmRoot"/>
-      </p:par>
-    </p:tnLst>
-  </p:timing>
 </p:sld>
 </file>
 
@@ -8121,10 +7860,9 @@
           <a:lstStyle/>
           <a:p>
             <a:r>
-              <a:rPr lang="en-US" b="1" dirty="0" smtClean="0"/>
+              <a:rPr lang="en-US" b="1" dirty="0"/>
               <a:t>Thanks!</a:t>
             </a:r>
-            <a:endParaRPr lang="en-US" b="1" dirty="0"/>
           </a:p>
         </p:txBody>
       </p:sp>
@@ -8152,10 +7890,10 @@
               <a:buNone/>
             </a:pPr>
             <a:r>
-              <a:rPr lang="en-US" sz="4800" b="1" dirty="0" smtClean="0"/>
+              <a:rPr lang="en-US" sz="4800" b="1" dirty="0"/>
               <a:t>Questions?</a:t>
             </a:r>
-            <a:endParaRPr lang="en-US" sz="2800" b="1" dirty="0" smtClean="0"/>
+            <a:endParaRPr lang="en-US" sz="2800" b="1" dirty="0"/>
           </a:p>
         </p:txBody>
       </p:sp>
@@ -8167,13 +7905,6 @@
   <p:transition>
     <p:fade/>
   </p:transition>
-  <p:timing>
-    <p:tnLst>
-      <p:par>
-        <p:cTn id="1" dur="indefinite" restart="never" nodeType="tmRoot"/>
-      </p:par>
-    </p:tnLst>
-  </p:timing>
 </p:sld>
 </file>
 
@@ -8215,10 +7946,9 @@
           <a:lstStyle/>
           <a:p>
             <a:r>
-              <a:rPr lang="en-US" b="1" dirty="0" smtClean="0"/>
+              <a:rPr lang="en-US" b="1" dirty="0"/>
               <a:t>Goal</a:t>
             </a:r>
-            <a:endParaRPr lang="en-US" b="1" dirty="0"/>
           </a:p>
         </p:txBody>
       </p:sp>
@@ -8246,7 +7976,7 @@
               <a:buNone/>
             </a:pPr>
             <a:r>
-              <a:rPr lang="en-US" b="1" i="1" dirty="0" smtClean="0"/>
+              <a:rPr lang="en-US" b="1" i="1" dirty="0"/>
               <a:t>Get a basic understanding of open source tooling that helps YOUR security solution.</a:t>
             </a:r>
           </a:p>
@@ -8255,10 +7985,9 @@
               <a:buNone/>
             </a:pPr>
             <a:r>
-              <a:rPr lang="en-US" b="1" i="1" dirty="0" smtClean="0"/>
+              <a:rPr lang="en-US" b="1" i="1" dirty="0"/>
               <a:t>Spark ideas about what you add to your application to make user authentication easier and simple.</a:t>
             </a:r>
-            <a:endParaRPr lang="en-US" b="1" i="1" dirty="0"/>
           </a:p>
         </p:txBody>
       </p:sp>
@@ -8275,13 +8004,6 @@
   <p:transition>
     <p:fade/>
   </p:transition>
-  <p:timing>
-    <p:tnLst>
-      <p:par>
-        <p:cTn id="1" dur="indefinite" restart="never" nodeType="tmRoot"/>
-      </p:par>
-    </p:tnLst>
-  </p:timing>
 </p:sld>
 </file>
 
@@ -8323,10 +8045,9 @@
           <a:lstStyle/>
           <a:p>
             <a:r>
-              <a:rPr lang="en-US" b="1" dirty="0" smtClean="0"/>
+              <a:rPr lang="en-US" b="1" dirty="0"/>
               <a:t>Caveat</a:t>
             </a:r>
-            <a:endParaRPr lang="en-US" b="1" dirty="0"/>
           </a:p>
         </p:txBody>
       </p:sp>
@@ -8354,7 +8075,7 @@
               <a:buNone/>
             </a:pPr>
             <a:r>
-              <a:rPr lang="en-US" b="1" i="1" dirty="0" smtClean="0"/>
+              <a:rPr lang="en-US" b="1" i="1" dirty="0"/>
               <a:t>Your mileage may vary with the topics and approaches discussed. </a:t>
             </a:r>
           </a:p>
@@ -8363,10 +8084,9 @@
               <a:buNone/>
             </a:pPr>
             <a:r>
-              <a:rPr lang="en-US" b="1" i="1" dirty="0" smtClean="0"/>
+              <a:rPr lang="en-US" b="1" i="1" dirty="0"/>
               <a:t>Implementation of an SSO solution will vary depending on your business needs.</a:t>
             </a:r>
-            <a:endParaRPr lang="en-US" b="1" i="1" dirty="0"/>
           </a:p>
         </p:txBody>
       </p:sp>
@@ -8383,13 +8103,6 @@
   <p:transition>
     <p:fade/>
   </p:transition>
-  <p:timing>
-    <p:tnLst>
-      <p:par>
-        <p:cTn id="1" dur="indefinite" restart="never" nodeType="tmRoot"/>
-      </p:par>
-    </p:tnLst>
-  </p:timing>
 </p:sld>
 </file>
 
@@ -8426,10 +8139,9 @@
           <a:lstStyle/>
           <a:p>
             <a:r>
-              <a:rPr lang="en-US" b="1" dirty="0" smtClean="0"/>
+              <a:rPr lang="en-US" b="1" dirty="0"/>
               <a:t>Info</a:t>
             </a:r>
-            <a:endParaRPr lang="en-US" b="1" dirty="0"/>
           </a:p>
         </p:txBody>
       </p:sp>
@@ -8457,7 +8169,7 @@
               <a:buNone/>
             </a:pPr>
             <a:r>
-              <a:rPr lang="en-US" b="1" dirty="0" smtClean="0"/>
+              <a:rPr lang="en-US" b="1" dirty="0"/>
               <a:t>javier@lozanotek.com</a:t>
             </a:r>
           </a:p>
@@ -8466,7 +8178,7 @@
               <a:buNone/>
             </a:pPr>
             <a:r>
-              <a:rPr lang="en-US" b="1" dirty="0" smtClean="0"/>
+              <a:rPr lang="en-US" b="1" dirty="0"/>
               <a:t>@jglozano</a:t>
             </a:r>
           </a:p>
@@ -8475,7 +8187,7 @@
               <a:buNone/>
             </a:pPr>
             <a:r>
-              <a:rPr lang="en-US" b="1" dirty="0" smtClean="0"/>
+              <a:rPr lang="en-US" b="1" dirty="0"/>
               <a:t>http://jglozano.io</a:t>
             </a:r>
           </a:p>
@@ -8568,83 +8280,14 @@
           <a:lstStyle/>
           <a:p>
             <a:r>
-              <a:rPr lang="en-US" sz="3000" b="1" dirty="0" smtClean="0">
-                <a:latin typeface="+mn-lt"/>
-              </a:rPr>
-              <a:t>https:</a:t>
-            </a:r>
-            <a:r>
               <a:rPr lang="en-US" sz="3000" b="1" dirty="0">
                 <a:latin typeface="+mn-lt"/>
               </a:rPr>
-              <a:t>//</a:t>
-            </a:r>
-            <a:r>
-              <a:rPr lang="en-US" sz="3000" b="1" dirty="0" smtClean="0">
-                <a:latin typeface="+mn-lt"/>
-              </a:rPr>
-              <a:t>github.com/lozanotek/aspnet-security</a:t>
-            </a:r>
-            <a:endParaRPr lang="en-US" sz="3000" b="1" dirty="0">
-              <a:latin typeface="+mn-lt"/>
-            </a:endParaRPr>
-          </a:p>
-        </p:txBody>
-      </p:sp>
-      <p:pic>
-        <p:nvPicPr>
-          <p:cNvPr id="8" name="Picture 7"/>
-          <p:cNvPicPr>
-            <a:picLocks noChangeAspect="1"/>
-          </p:cNvPicPr>
-          <p:nvPr/>
-        </p:nvPicPr>
-        <p:blipFill>
-          <a:blip r:embed="rId4"/>
-          <a:stretch>
-            <a:fillRect/>
-          </a:stretch>
-        </p:blipFill>
-        <p:spPr>
-          <a:xfrm>
-            <a:off x="5714999" y="2209800"/>
-            <a:ext cx="3033889" cy="819150"/>
-          </a:xfrm>
-          <a:prstGeom prst="rect">
-            <a:avLst/>
-          </a:prstGeom>
-        </p:spPr>
-      </p:pic>
-      <p:pic>
-        <p:nvPicPr>
-          <p:cNvPr id="9" name="Picture 8"/>
-          <p:cNvPicPr>
-            <a:picLocks noChangeAspect="1"/>
-          </p:cNvPicPr>
-          <p:nvPr/>
-        </p:nvPicPr>
-        <p:blipFill>
-          <a:blip r:embed="rId5">
-            <a:extLst>
-              <a:ext uri="{28A0092B-C50C-407E-A947-70E740481C1C}">
-                <a14:useLocalDpi xmlns:a14="http://schemas.microsoft.com/office/drawing/2010/main" val="0"/>
-              </a:ext>
-            </a:extLst>
-          </a:blip>
-          <a:stretch>
-            <a:fillRect/>
-          </a:stretch>
-        </p:blipFill>
-        <p:spPr>
-          <a:xfrm>
-            <a:off x="5910500" y="3086100"/>
-            <a:ext cx="2838388" cy="704850"/>
-          </a:xfrm>
-          <a:prstGeom prst="rect">
-            <a:avLst/>
-          </a:prstGeom>
-        </p:spPr>
-      </p:pic>
+              <a:t>https://github.com/lozanotek/aspnet-security</a:t>
+            </a:r>
+          </a:p>
+        </p:txBody>
+      </p:sp>
     </p:spTree>
     <p:extLst>
       <p:ext uri="{BB962C8B-B14F-4D97-AF65-F5344CB8AC3E}">
@@ -8667,13 +8310,6 @@
       </p:transition>
     </mc:Fallback>
   </mc:AlternateContent>
-  <p:timing>
-    <p:tnLst>
-      <p:par>
-        <p:cTn id="1" dur="indefinite" restart="never" nodeType="tmRoot"/>
-      </p:par>
-    </p:tnLst>
-  </p:timing>
 </p:sld>
 </file>
 
@@ -8710,10 +8346,9 @@
           <a:lstStyle/>
           <a:p>
             <a:r>
-              <a:rPr lang="en-US" b="1" dirty="0" smtClean="0"/>
+              <a:rPr lang="en-US" b="1" dirty="0"/>
               <a:t>Agenda</a:t>
             </a:r>
-            <a:endParaRPr lang="en-US" b="1" dirty="0"/>
           </a:p>
         </p:txBody>
       </p:sp>
@@ -8738,13 +8373,13 @@
           <a:lstStyle/>
           <a:p>
             <a:r>
-              <a:rPr lang="en-US" dirty="0" smtClean="0"/>
+              <a:rPr lang="en-US" dirty="0"/>
               <a:t>Quick Overview</a:t>
             </a:r>
           </a:p>
           <a:p>
             <a:r>
-              <a:rPr lang="en-US" dirty="0" smtClean="0"/>
+              <a:rPr lang="en-US" dirty="0"/>
               <a:t>Demos, Demos, Demos!</a:t>
             </a:r>
           </a:p>
@@ -8758,13 +8393,6 @@
   <p:transition>
     <p:fade/>
   </p:transition>
-  <p:timing>
-    <p:tnLst>
-      <p:par>
-        <p:cTn id="1" dur="indefinite" restart="never" nodeType="tmRoot"/>
-      </p:par>
-    </p:tnLst>
-  </p:timing>
 </p:sld>
 </file>
 
@@ -8806,10 +8434,9 @@
           <a:lstStyle/>
           <a:p>
             <a:r>
-              <a:rPr lang="en-US" b="1" dirty="0" smtClean="0"/>
+              <a:rPr lang="en-US" b="1" dirty="0"/>
               <a:t>Authentication Flow</a:t>
             </a:r>
-            <a:endParaRPr lang="en-US" b="1" dirty="0"/>
           </a:p>
         </p:txBody>
       </p:sp>
@@ -9120,23 +8747,23 @@
           </a:lstStyle>
           <a:p>
             <a:r>
-              <a:rPr lang="en-US" kern="0" dirty="0" smtClean="0"/>
+              <a:rPr lang="en-US" kern="0" dirty="0"/>
               <a:t>Helps define </a:t>
             </a:r>
             <a:r>
-              <a:rPr lang="en-US" i="1" kern="0" dirty="0" smtClean="0"/>
+              <a:rPr lang="en-US" i="1" kern="0" dirty="0"/>
               <a:t>delegation protocol</a:t>
             </a:r>
             <a:r>
-              <a:rPr lang="en-US" kern="0" dirty="0" smtClean="0"/>
+              <a:rPr lang="en-US" kern="0" dirty="0"/>
               <a:t> for conveying </a:t>
             </a:r>
             <a:r>
-              <a:rPr lang="en-US" i="1" kern="0" dirty="0" smtClean="0"/>
+              <a:rPr lang="en-US" i="1" kern="0" dirty="0"/>
               <a:t>authorization decisions</a:t>
             </a:r>
             <a:r>
-              <a:rPr lang="en-US" kern="0" dirty="0" smtClean="0"/>
+              <a:rPr lang="en-US" kern="0" dirty="0"/>
               <a:t> for applications and APIs….</a:t>
             </a:r>
           </a:p>
@@ -9151,13 +8778,12 @@
               <a:rPr lang="en-US" sz="2800" i="1" kern="0" dirty="0"/>
               <a:t>http://oauth.net/articles/authentication/</a:t>
             </a:r>
-            <a:endParaRPr lang="en-US" sz="2800" i="1" kern="0" dirty="0" smtClean="0"/>
           </a:p>
           <a:p>
             <a:pPr marL="0" indent="0">
               <a:buNone/>
             </a:pPr>
-            <a:endParaRPr lang="en-US" kern="0" dirty="0" smtClean="0"/>
+            <a:endParaRPr lang="en-US" kern="0" dirty="0"/>
           </a:p>
         </p:txBody>
       </p:sp>
@@ -9174,13 +8800,6 @@
   <p:transition>
     <p:fade/>
   </p:transition>
-  <p:timing>
-    <p:tnLst>
-      <p:par>
-        <p:cTn id="1" dur="indefinite" restart="never" nodeType="tmRoot"/>
-      </p:par>
-    </p:tnLst>
-  </p:timing>
 </p:sld>
 </file>
 
@@ -9217,10 +8836,9 @@
           <a:lstStyle/>
           <a:p>
             <a:r>
-              <a:rPr lang="en-US" b="1" dirty="0" smtClean="0"/>
+              <a:rPr lang="en-US" b="1" dirty="0"/>
               <a:t>Authentication Flow</a:t>
             </a:r>
-            <a:endParaRPr lang="en-US" b="1" dirty="0"/>
           </a:p>
         </p:txBody>
       </p:sp>
@@ -9305,10 +8923,9 @@
           <a:lstStyle/>
           <a:p>
             <a:r>
-              <a:rPr lang="en-US" dirty="0" smtClean="0"/>
+              <a:rPr lang="en-US" dirty="0"/>
               <a:t>Rumba (Men)</a:t>
             </a:r>
-            <a:endParaRPr lang="en-US" dirty="0"/>
           </a:p>
         </p:txBody>
       </p:sp>
@@ -9325,13 +8942,6 @@
   <p:transition>
     <p:fade/>
   </p:transition>
-  <p:timing>
-    <p:tnLst>
-      <p:par>
-        <p:cTn id="1" dur="indefinite" restart="never" nodeType="tmRoot"/>
-      </p:par>
-    </p:tnLst>
-  </p:timing>
 </p:sld>
 </file>
 
@@ -9368,10 +8978,9 @@
           <a:lstStyle/>
           <a:p>
             <a:r>
-              <a:rPr lang="en-US" b="1" dirty="0" smtClean="0"/>
+              <a:rPr lang="en-US" b="1" dirty="0"/>
               <a:t>Authentication Flow</a:t>
             </a:r>
-            <a:endParaRPr lang="en-US" b="1" dirty="0"/>
           </a:p>
         </p:txBody>
       </p:sp>
@@ -9456,10 +9065,9 @@
           <a:lstStyle/>
           <a:p>
             <a:r>
-              <a:rPr lang="en-US" dirty="0" smtClean="0"/>
+              <a:rPr lang="en-US" dirty="0"/>
               <a:t>Rumba (Women)</a:t>
             </a:r>
-            <a:endParaRPr lang="en-US" dirty="0"/>
           </a:p>
         </p:txBody>
       </p:sp>
@@ -9476,13 +9084,6 @@
   <p:transition>
     <p:fade/>
   </p:transition>
-  <p:timing>
-    <p:tnLst>
-      <p:par>
-        <p:cTn id="1" dur="indefinite" restart="never" nodeType="tmRoot"/>
-      </p:par>
-    </p:tnLst>
-  </p:timing>
 </p:sld>
 </file>
 
@@ -9519,10 +9120,9 @@
           <a:lstStyle/>
           <a:p>
             <a:r>
-              <a:rPr lang="en-US" b="1" dirty="0" smtClean="0"/>
+              <a:rPr lang="en-US" b="1" dirty="0"/>
               <a:t>Authentication Flow</a:t>
             </a:r>
-            <a:endParaRPr lang="en-US" b="1" dirty="0"/>
           </a:p>
         </p:txBody>
       </p:sp>
@@ -9547,14 +9147,14 @@
           <a:lstStyle/>
           <a:p>
             <a:r>
-              <a:rPr lang="en-US" dirty="0" smtClean="0"/>
+              <a:rPr lang="en-US" dirty="0"/>
               <a:t>OAuth 2</a:t>
             </a:r>
           </a:p>
           <a:p>
             <a:pPr lvl="1"/>
             <a:r>
-              <a:rPr lang="en-US" dirty="0" smtClean="0">
+              <a:rPr lang="en-US" dirty="0">
                 <a:effectLst/>
               </a:rPr>
               <a:t>Delegation protocol for authorization decisions</a:t>
@@ -9563,40 +9163,16 @@
           <a:p>
             <a:pPr lvl="1"/>
             <a:r>
-              <a:rPr lang="en-US" dirty="0" smtClean="0">
-                <a:effectLst/>
-              </a:rPr>
-              <a:t>Allows issuance of access </a:t>
-            </a:r>
-            <a:r>
               <a:rPr lang="en-US" dirty="0">
                 <a:effectLst/>
               </a:rPr>
-              <a:t>tokens </a:t>
-            </a:r>
-            <a:r>
-              <a:rPr lang="en-US" dirty="0" smtClean="0">
-                <a:effectLst/>
-              </a:rPr>
-              <a:t>to </a:t>
-            </a:r>
+              <a:t>Allows issuance of access tokens to third-party clients once approved by an owner (user)</a:t>
+            </a:r>
+          </a:p>
+          <a:p>
+            <a:pPr lvl="1"/>
             <a:r>
               <a:rPr lang="en-US" dirty="0">
-                <a:effectLst/>
-              </a:rPr>
-              <a:t>third-party clients </a:t>
-            </a:r>
-            <a:r>
-              <a:rPr lang="en-US" dirty="0" smtClean="0">
-                <a:effectLst/>
-              </a:rPr>
-              <a:t>once approved by an owner (user)</a:t>
-            </a:r>
-          </a:p>
-          <a:p>
-            <a:pPr lvl="1"/>
-            <a:r>
-              <a:rPr lang="en-US" dirty="0" smtClean="0">
                 <a:effectLst/>
               </a:rPr>
               <a:t>Access tokens grant (limited) access to owner resources (pictures, timeline, tweets, etc.)</a:t>
@@ -9617,13 +9193,6 @@
   <p:transition>
     <p:fade/>
   </p:transition>
-  <p:timing>
-    <p:tnLst>
-      <p:par>
-        <p:cTn id="1" dur="indefinite" restart="never" nodeType="tmRoot"/>
-      </p:par>
-    </p:tnLst>
-  </p:timing>
 </p:sld>
 </file>
 

</xml_diff>

<commit_message>
Updated the slide decks
</commit_message>
<xml_diff>
--- a/slides/AspNetWebSecurity.pptx
+++ b/slides/AspNetWebSecurity.pptx
@@ -288,7 +288,7 @@
               <a:pPr>
                 <a:defRPr/>
               </a:pPr>
-              <a:t>4/20/2016 12:06 PM</a:t>
+              <a:t>10/25/2016 3:39 PM</a:t>
             </a:fld>
             <a:endParaRPr lang="en-US"/>
           </a:p>
@@ -503,7 +503,7 @@
               <a:pPr>
                 <a:defRPr/>
               </a:pPr>
-              <a:t>4/20/2016 12:06 PM</a:t>
+              <a:t>10/25/2016 3:39 PM</a:t>
             </a:fld>
             <a:endParaRPr lang="en-US"/>
           </a:p>
@@ -908,7 +908,7 @@
             <a:fld id="{645EDAD1-88E4-4536-AD95-0BFD82EC77E6}" type="datetime8">
               <a:rPr lang="en-US" smtClean="0"/>
               <a:pPr/>
-              <a:t>4/20/2016 12:06 PM</a:t>
+              <a:t>10/25/2016 3:39 PM</a:t>
             </a:fld>
             <a:endParaRPr lang="en-US"/>
           </a:p>
@@ -6855,7 +6855,7 @@
 </file>
 
 <file path=ppt/slides/slide11.xml><?xml version="1.0" encoding="utf-8"?>
-<p:sld xmlns:a="http://schemas.openxmlformats.org/drawingml/2006/main" xmlns:r="http://schemas.openxmlformats.org/officeDocument/2006/relationships" xmlns:p="http://schemas.openxmlformats.org/presentationml/2006/main">
+<p:sld xmlns:a="http://schemas.openxmlformats.org/drawingml/2006/main" xmlns:r="http://schemas.openxmlformats.org/officeDocument/2006/relationships" xmlns:p="http://schemas.openxmlformats.org/presentationml/2006/main" show="0">
   <p:cSld>
     <p:spTree>
       <p:nvGrpSpPr>
@@ -6991,7 +6991,7 @@
 </file>
 
 <file path=ppt/slides/slide12.xml><?xml version="1.0" encoding="utf-8"?>
-<p:sld xmlns:a="http://schemas.openxmlformats.org/drawingml/2006/main" xmlns:r="http://schemas.openxmlformats.org/officeDocument/2006/relationships" xmlns:p="http://schemas.openxmlformats.org/presentationml/2006/main">
+<p:sld xmlns:a="http://schemas.openxmlformats.org/drawingml/2006/main" xmlns:r="http://schemas.openxmlformats.org/officeDocument/2006/relationships" xmlns:p="http://schemas.openxmlformats.org/presentationml/2006/main" show="0">
   <p:cSld>
     <p:spTree>
       <p:nvGrpSpPr>
@@ -7090,7 +7090,7 @@
 </file>
 
 <file path=ppt/slides/slide13.xml><?xml version="1.0" encoding="utf-8"?>
-<p:sld xmlns:a="http://schemas.openxmlformats.org/drawingml/2006/main" xmlns:r="http://schemas.openxmlformats.org/officeDocument/2006/relationships" xmlns:p="http://schemas.openxmlformats.org/presentationml/2006/main">
+<p:sld xmlns:a="http://schemas.openxmlformats.org/drawingml/2006/main" xmlns:r="http://schemas.openxmlformats.org/officeDocument/2006/relationships" xmlns:p="http://schemas.openxmlformats.org/presentationml/2006/main" show="0">
   <p:cSld>
     <p:spTree>
       <p:nvGrpSpPr>
@@ -7530,7 +7530,7 @@
 </file>
 
 <file path=ppt/slides/slide14.xml><?xml version="1.0" encoding="utf-8"?>
-<p:sld xmlns:a="http://schemas.openxmlformats.org/drawingml/2006/main" xmlns:r="http://schemas.openxmlformats.org/officeDocument/2006/relationships" xmlns:p="http://schemas.openxmlformats.org/presentationml/2006/main">
+<p:sld xmlns:a="http://schemas.openxmlformats.org/drawingml/2006/main" xmlns:r="http://schemas.openxmlformats.org/officeDocument/2006/relationships" xmlns:p="http://schemas.openxmlformats.org/presentationml/2006/main" show="0">
   <p:cSld>
     <p:spTree>
       <p:nvGrpSpPr>
@@ -7646,7 +7646,7 @@
 </file>
 
 <file path=ppt/slides/slide15.xml><?xml version="1.0" encoding="utf-8"?>
-<p:sld xmlns:a="http://schemas.openxmlformats.org/drawingml/2006/main" xmlns:r="http://schemas.openxmlformats.org/officeDocument/2006/relationships" xmlns:p="http://schemas.openxmlformats.org/presentationml/2006/main">
+<p:sld xmlns:a="http://schemas.openxmlformats.org/drawingml/2006/main" xmlns:r="http://schemas.openxmlformats.org/officeDocument/2006/relationships" xmlns:p="http://schemas.openxmlformats.org/presentationml/2006/main" show="0">
   <p:cSld>
     <p:spTree>
       <p:nvGrpSpPr>

</xml_diff>